<commit_message>
Update Week 4 Lecture 1 - Partial Fraction.pptx
</commit_message>
<xml_diff>
--- a/PP WORK/Instructor Version/Week 4/Week 4 Lecture 1 - Partial Fraction.pptx
+++ b/PP WORK/Instructor Version/Week 4/Week 4 Lecture 1 - Partial Fraction.pptx
@@ -127,7 +127,7 @@
   </p:defaultTextStyle>
   <p:extLst>
     <p:ext uri="{EFAFB233-063F-42B5-8137-9DF3F51BA10A}">
-      <p15:sldGuideLst xmlns:p15="http://schemas.microsoft.com/office/powerpoint/2012/main"/>
+      <p15:sldGuideLst xmlns:p15="http://schemas.microsoft.com/office/powerpoint/2012/main" xmlns=""/>
     </p:ext>
   </p:extLst>
 </p:presentation>
@@ -215,7 +215,7 @@
           <a:p>
             <a:fld id="{18AB4343-410D-4114-8175-E2D7C9308D80}" type="datetimeFigureOut">
               <a:rPr lang="en-US" smtClean="0"/>
-              <a:t>10/15/2024</a:t>
+              <a:t>1/13/2025</a:t>
             </a:fld>
             <a:endParaRPr lang="en-US"/>
           </a:p>
@@ -1314,7 +1314,7 @@
           <a:p>
             <a:fld id="{1D8BD707-D9CF-40AE-B4C6-C98DA3205C09}" type="datetimeFigureOut">
               <a:rPr lang="en-US"/>
-              <a:t>10/15/2024</a:t>
+              <a:t>1/13/2025</a:t>
             </a:fld>
             <a:endParaRPr lang="en-US"/>
           </a:p>
@@ -1484,7 +1484,7 @@
           <a:p>
             <a:fld id="{1D8BD707-D9CF-40AE-B4C6-C98DA3205C09}" type="datetimeFigureOut">
               <a:rPr lang="en-US"/>
-              <a:t>10/15/2024</a:t>
+              <a:t>1/13/2025</a:t>
             </a:fld>
             <a:endParaRPr lang="en-US"/>
           </a:p>
@@ -1697,7 +1697,7 @@
           <a:p>
             <a:fld id="{1D8BD707-D9CF-40AE-B4C6-C98DA3205C09}" type="datetimeFigureOut">
               <a:rPr lang="en-US"/>
-              <a:t>10/15/2024</a:t>
+              <a:t>1/13/2025</a:t>
             </a:fld>
             <a:endParaRPr lang="en-US"/>
           </a:p>
@@ -1844,7 +1844,7 @@
           <a:p>
             <a:fld id="{1D8BD707-D9CF-40AE-B4C6-C98DA3205C09}" type="datetimeFigureOut">
               <a:rPr lang="en-US"/>
-              <a:t>10/15/2024</a:t>
+              <a:t>1/13/2025</a:t>
             </a:fld>
             <a:endParaRPr lang="en-US"/>
           </a:p>
@@ -1968,7 +1968,7 @@
           <a:p>
             <a:fld id="{1D8BD707-D9CF-40AE-B4C6-C98DA3205C09}" type="datetimeFigureOut">
               <a:rPr lang="en-US"/>
-              <a:t>10/15/2024</a:t>
+              <a:t>1/13/2025</a:t>
             </a:fld>
             <a:endParaRPr lang="en-US"/>
           </a:p>
@@ -2041,7 +2041,7 @@
           <p:cNvPr id="25" name="Rectangle 24">
             <a:extLst>
               <a:ext uri="{FF2B5EF4-FFF2-40B4-BE49-F238E27FC236}">
-                <a16:creationId xmlns:a16="http://schemas.microsoft.com/office/drawing/2014/main" id="{669E0535-6FD9-4D8F-80CA-FF7A96DB665F}"/>
+                <a16:creationId xmlns:a16="http://schemas.microsoft.com/office/drawing/2014/main" xmlns="" id="{669E0535-6FD9-4D8F-80CA-FF7A96DB665F}"/>
               </a:ext>
             </a:extLst>
           </p:cNvPr>
@@ -2084,7 +2084,7 @@
           <a:lstStyle/>
           <a:p>
             <a:pPr algn="ctr"/>
-            <a:endParaRPr lang="en-KW" sz="2400"/>
+            <a:endParaRPr lang="x-none" sz="2400"/>
           </a:p>
         </p:txBody>
       </p:sp>
@@ -2093,7 +2093,7 @@
           <p:cNvPr id="26" name="Picture 25" descr="A black and red background with a bird&#10;&#10;Description automatically generated">
             <a:extLst>
               <a:ext uri="{FF2B5EF4-FFF2-40B4-BE49-F238E27FC236}">
-                <a16:creationId xmlns:a16="http://schemas.microsoft.com/office/drawing/2014/main" id="{7356EFA9-D406-4147-B1F7-82B217840839}"/>
+                <a16:creationId xmlns:a16="http://schemas.microsoft.com/office/drawing/2014/main" xmlns="" id="{7356EFA9-D406-4147-B1F7-82B217840839}"/>
               </a:ext>
             </a:extLst>
           </p:cNvPr>
@@ -2123,7 +2123,7 @@
           <p:cNvPr id="27" name="Google Shape;15;p13">
             <a:extLst>
               <a:ext uri="{FF2B5EF4-FFF2-40B4-BE49-F238E27FC236}">
-                <a16:creationId xmlns:a16="http://schemas.microsoft.com/office/drawing/2014/main" id="{F5F3B15A-58C1-48A3-AB6A-E8A3A8F0B1F0}"/>
+                <a16:creationId xmlns:a16="http://schemas.microsoft.com/office/drawing/2014/main" xmlns="" id="{F5F3B15A-58C1-48A3-AB6A-E8A3A8F0B1F0}"/>
               </a:ext>
             </a:extLst>
           </p:cNvPr>
@@ -2289,7 +2289,7 @@
           <p:cNvPr id="28" name="Google Shape;19;p14">
             <a:extLst>
               <a:ext uri="{FF2B5EF4-FFF2-40B4-BE49-F238E27FC236}">
-                <a16:creationId xmlns:a16="http://schemas.microsoft.com/office/drawing/2014/main" id="{A6353D6C-199F-4C21-9FC8-2D00FAAA26A6}"/>
+                <a16:creationId xmlns:a16="http://schemas.microsoft.com/office/drawing/2014/main" xmlns="" id="{A6353D6C-199F-4C21-9FC8-2D00FAAA26A6}"/>
               </a:ext>
             </a:extLst>
           </p:cNvPr>
@@ -2568,7 +2568,7 @@
           <p:cNvPr id="29" name="Google Shape;55;p1">
             <a:extLst>
               <a:ext uri="{FF2B5EF4-FFF2-40B4-BE49-F238E27FC236}">
-                <a16:creationId xmlns:a16="http://schemas.microsoft.com/office/drawing/2014/main" id="{4544F053-DAFF-4191-A4FE-EAC318BF6A0C}"/>
+                <a16:creationId xmlns:a16="http://schemas.microsoft.com/office/drawing/2014/main" xmlns="" id="{4544F053-DAFF-4191-A4FE-EAC318BF6A0C}"/>
               </a:ext>
             </a:extLst>
           </p:cNvPr>
@@ -2640,7 +2640,7 @@
           <p:cNvPr id="2" name="Title 1">
             <a:extLst>
               <a:ext uri="{FF2B5EF4-FFF2-40B4-BE49-F238E27FC236}">
-                <a16:creationId xmlns:a16="http://schemas.microsoft.com/office/drawing/2014/main" id="{7B6E2517-3805-41A0-9280-523D3C8CC82F}"/>
+                <a16:creationId xmlns:a16="http://schemas.microsoft.com/office/drawing/2014/main" xmlns="" id="{7B6E2517-3805-41A0-9280-523D3C8CC82F}"/>
               </a:ext>
             </a:extLst>
           </p:cNvPr>
@@ -2712,7 +2712,7 @@
           <p:cNvPr id="8" name="Google Shape;54;p1">
             <a:extLst>
               <a:ext uri="{FF2B5EF4-FFF2-40B4-BE49-F238E27FC236}">
-                <a16:creationId xmlns:a16="http://schemas.microsoft.com/office/drawing/2014/main" id="{631C2DF5-1362-47E0-9992-CA0F5EE5E7F4}"/>
+                <a16:creationId xmlns:a16="http://schemas.microsoft.com/office/drawing/2014/main" xmlns="" id="{631C2DF5-1362-47E0-9992-CA0F5EE5E7F4}"/>
               </a:ext>
             </a:extLst>
           </p:cNvPr>
@@ -2799,7 +2799,7 @@
           <p:cNvPr id="9" name="Google Shape;55;p1">
             <a:extLst>
               <a:ext uri="{FF2B5EF4-FFF2-40B4-BE49-F238E27FC236}">
-                <a16:creationId xmlns:a16="http://schemas.microsoft.com/office/drawing/2014/main" id="{E5E4EFC6-10AC-457A-90BE-EB16C5D5FDC1}"/>
+                <a16:creationId xmlns:a16="http://schemas.microsoft.com/office/drawing/2014/main" xmlns="" id="{E5E4EFC6-10AC-457A-90BE-EB16C5D5FDC1}"/>
               </a:ext>
             </a:extLst>
           </p:cNvPr>
@@ -2871,7 +2871,7 @@
           <p:cNvPr id="10" name="Oval 9">
             <a:extLst>
               <a:ext uri="{FF2B5EF4-FFF2-40B4-BE49-F238E27FC236}">
-                <a16:creationId xmlns:a16="http://schemas.microsoft.com/office/drawing/2014/main" id="{38DC77A7-8710-436F-B5E7-19B60E66B5F0}"/>
+                <a16:creationId xmlns:a16="http://schemas.microsoft.com/office/drawing/2014/main" xmlns="" id="{38DC77A7-8710-436F-B5E7-19B60E66B5F0}"/>
               </a:ext>
             </a:extLst>
           </p:cNvPr>
@@ -2914,7 +2914,7 @@
           <a:lstStyle/>
           <a:p>
             <a:pPr algn="ctr"/>
-            <a:endParaRPr lang="en-KW" sz="2400"/>
+            <a:endParaRPr lang="x-none" sz="2400"/>
           </a:p>
         </p:txBody>
       </p:sp>
@@ -2923,7 +2923,7 @@
           <p:cNvPr id="11" name="Picture 10" descr="A red and white background with a design&#10;&#10;Description automatically generated">
             <a:extLst>
               <a:ext uri="{FF2B5EF4-FFF2-40B4-BE49-F238E27FC236}">
-                <a16:creationId xmlns:a16="http://schemas.microsoft.com/office/drawing/2014/main" id="{418E62F8-02A7-4379-A005-0EF5EC635BBF}"/>
+                <a16:creationId xmlns:a16="http://schemas.microsoft.com/office/drawing/2014/main" xmlns="" id="{418E62F8-02A7-4379-A005-0EF5EC635BBF}"/>
               </a:ext>
             </a:extLst>
           </p:cNvPr>
@@ -2953,7 +2953,7 @@
           <p:cNvPr id="12" name="Picture 11">
             <a:extLst>
               <a:ext uri="{FF2B5EF4-FFF2-40B4-BE49-F238E27FC236}">
-                <a16:creationId xmlns:a16="http://schemas.microsoft.com/office/drawing/2014/main" id="{28A0ADE9-7A46-486B-82F3-A690D904DFF4}"/>
+                <a16:creationId xmlns:a16="http://schemas.microsoft.com/office/drawing/2014/main" xmlns="" id="{28A0ADE9-7A46-486B-82F3-A690D904DFF4}"/>
               </a:ext>
             </a:extLst>
           </p:cNvPr>
@@ -3180,7 +3180,7 @@
           <a:p>
             <a:fld id="{1D8BD707-D9CF-40AE-B4C6-C98DA3205C09}" type="datetimeFigureOut">
               <a:rPr lang="en-US"/>
-              <a:t>10/15/2024</a:t>
+              <a:t>1/13/2025</a:t>
             </a:fld>
             <a:endParaRPr lang="en-US"/>
           </a:p>
@@ -3440,7 +3440,7 @@
             <a:r>
               <a:rPr lang="en-US" sz="3600" b="1" dirty="0">
                 <a:solidFill>
-                  <a:srgbClr val="00B050"/>
+                  <a:srgbClr val="0000FF"/>
                 </a:solidFill>
                 <a:latin typeface="Arial" pitchFamily="34" charset="0"/>
                 <a:cs typeface="Arial" pitchFamily="34" charset="0"/>
@@ -3453,7 +3453,7 @@
             <a:r>
               <a:rPr lang="x-none" sz="3600" b="1" dirty="0">
                 <a:solidFill>
-                  <a:srgbClr val="00B050"/>
+                  <a:srgbClr val="0000FF"/>
                 </a:solidFill>
                 <a:latin typeface="Arial" pitchFamily="34" charset="0"/>
                 <a:cs typeface="Arial" pitchFamily="34" charset="0"/>
@@ -3463,7 +3463,7 @@
             <a:r>
               <a:rPr lang="en-US" sz="3600" b="1" dirty="0">
                 <a:solidFill>
-                  <a:srgbClr val="00B050"/>
+                  <a:srgbClr val="0000FF"/>
                 </a:solidFill>
                 <a:latin typeface="Arial" pitchFamily="34" charset="0"/>
                 <a:cs typeface="Arial" pitchFamily="34" charset="0"/>
@@ -3473,23 +3473,40 @@
             <a:r>
               <a:rPr lang="x-none" sz="3600" b="1" dirty="0">
                 <a:solidFill>
-                  <a:srgbClr val="00B050"/>
+                  <a:srgbClr val="0000FF"/>
                 </a:solidFill>
                 <a:latin typeface="Arial" pitchFamily="34" charset="0"/>
                 <a:cs typeface="Arial" pitchFamily="34" charset="0"/>
               </a:rPr>
-              <a:t> 20</a:t>
+              <a:t> </a:t>
             </a:r>
             <a:r>
-              <a:rPr lang="en-US" sz="3600" b="1" dirty="0">
+              <a:rPr lang="x-none" sz="3600" b="1">
                 <a:solidFill>
-                  <a:srgbClr val="00B050"/>
+                  <a:srgbClr val="0000FF"/>
                 </a:solidFill>
                 <a:latin typeface="Arial" pitchFamily="34" charset="0"/>
                 <a:cs typeface="Arial" pitchFamily="34" charset="0"/>
               </a:rPr>
-              <a:t>2</a:t>
+              <a:t>20</a:t>
             </a:r>
+            <a:r>
+              <a:rPr lang="en-US" sz="3600" b="1" smtClean="0">
+                <a:solidFill>
+                  <a:srgbClr val="0000FF"/>
+                </a:solidFill>
+                <a:latin typeface="Arial" pitchFamily="34" charset="0"/>
+                <a:cs typeface="Arial" pitchFamily="34" charset="0"/>
+              </a:rPr>
+              <a:t>2 – Spring 2025</a:t>
+            </a:r>
+            <a:endParaRPr lang="en-US" sz="3600" b="1" dirty="0">
+              <a:solidFill>
+                <a:srgbClr val="0000FF"/>
+              </a:solidFill>
+              <a:latin typeface="Arial" pitchFamily="34" charset="0"/>
+              <a:cs typeface="Arial" pitchFamily="34" charset="0"/>
+            </a:endParaRPr>
           </a:p>
         </p:txBody>
       </p:sp>
@@ -3498,7 +3515,7 @@
           <p:cNvPr id="2" name="TextBox 1">
             <a:extLst>
               <a:ext uri="{FF2B5EF4-FFF2-40B4-BE49-F238E27FC236}">
-                <a16:creationId xmlns:a16="http://schemas.microsoft.com/office/drawing/2014/main" id="{07DEEC26-75A9-F4A2-6948-691F17B753B2}"/>
+                <a16:creationId xmlns:a16="http://schemas.microsoft.com/office/drawing/2014/main" xmlns="" id="{07DEEC26-75A9-F4A2-6948-691F17B753B2}"/>
               </a:ext>
             </a:extLst>
           </p:cNvPr>
@@ -3524,7 +3541,7 @@
             <a:r>
               <a:rPr lang="en-US" sz="4400" b="1" dirty="0">
                 <a:solidFill>
-                  <a:srgbClr val="0000FF"/>
+                  <a:srgbClr val="00B050"/>
                 </a:solidFill>
                 <a:latin typeface="Cambria" panose="02040503050406030204" pitchFamily="18" charset="0"/>
               </a:rPr>
@@ -3626,7 +3643,7 @@
                       <m:fPr>
                         <m:ctrlPr>
                           <a:rPr lang="en-US" sz="2800" i="1" dirty="0" smtClean="0">
-                            <a:latin typeface="Cambria Math" panose="02040503050406030204" pitchFamily="18" charset="0"/>
+                            <a:latin typeface="Cambria Math"/>
                             <a:ea typeface="Cambria Math" panose="02040503050406030204" pitchFamily="18" charset="0"/>
                           </a:rPr>
                         </m:ctrlPr>
@@ -3636,7 +3653,7 @@
                           <m:sSupPr>
                             <m:ctrlPr>
                               <a:rPr lang="en-US" sz="2800" i="1" dirty="0">
-                                <a:latin typeface="Cambria Math" panose="02040503050406030204" pitchFamily="18" charset="0"/>
+                                <a:latin typeface="Cambria Math"/>
                                 <a:ea typeface="Cambria Math" panose="02040503050406030204" pitchFamily="18" charset="0"/>
                               </a:rPr>
                             </m:ctrlPr>
@@ -3715,7 +3732,7 @@
                           <m:sSupPr>
                             <m:ctrlPr>
                               <a:rPr lang="en-US" sz="2800" i="1" dirty="0">
-                                <a:latin typeface="Cambria Math" panose="02040503050406030204" pitchFamily="18" charset="0"/>
+                                <a:latin typeface="Cambria Math"/>
                                 <a:ea typeface="Cambria Math" panose="02040503050406030204" pitchFamily="18" charset="0"/>
                               </a:rPr>
                             </m:ctrlPr>
@@ -3763,7 +3780,7 @@
                       <m:fPr>
                         <m:ctrlPr>
                           <a:rPr lang="en-US" sz="2800" i="1" dirty="0" smtClean="0">
-                            <a:latin typeface="Cambria Math" panose="02040503050406030204" pitchFamily="18" charset="0"/>
+                            <a:latin typeface="Cambria Math"/>
                             <a:ea typeface="Cambria Math" panose="02040503050406030204" pitchFamily="18" charset="0"/>
                           </a:rPr>
                         </m:ctrlPr>
@@ -3798,7 +3815,7 @@
                       <m:fPr>
                         <m:ctrlPr>
                           <a:rPr lang="en-US" sz="2800" b="0" i="1" dirty="0" smtClean="0">
-                            <a:latin typeface="Cambria Math" panose="02040503050406030204" pitchFamily="18" charset="0"/>
+                            <a:latin typeface="Cambria Math"/>
                             <a:ea typeface="Cambria Math" panose="02040503050406030204" pitchFamily="18" charset="0"/>
                           </a:rPr>
                         </m:ctrlPr>
@@ -3831,7 +3848,7 @@
                           <m:sSupPr>
                             <m:ctrlPr>
                               <a:rPr lang="en-US" sz="2800" b="0" i="1" dirty="0" smtClean="0">
-                                <a:latin typeface="Cambria Math" panose="02040503050406030204" pitchFamily="18" charset="0"/>
+                                <a:latin typeface="Cambria Math"/>
                                 <a:ea typeface="Cambria Math" panose="02040503050406030204" pitchFamily="18" charset="0"/>
                               </a:rPr>
                             </m:ctrlPr>
@@ -3989,7 +4006,7 @@
                       <m:fPr>
                         <m:ctrlPr>
                           <a:rPr lang="en-US" sz="3200" i="1" dirty="0">
-                            <a:latin typeface="Cambria Math" panose="02040503050406030204" pitchFamily="18" charset="0"/>
+                            <a:latin typeface="Cambria Math"/>
                             <a:ea typeface="Cambria Math" panose="02040503050406030204" pitchFamily="18" charset="0"/>
                           </a:rPr>
                         </m:ctrlPr>
@@ -3999,7 +4016,7 @@
                           <m:sSupPr>
                             <m:ctrlPr>
                               <a:rPr lang="en-US" sz="3200" i="1" dirty="0">
-                                <a:latin typeface="Cambria Math" panose="02040503050406030204" pitchFamily="18" charset="0"/>
+                                <a:latin typeface="Cambria Math"/>
                                 <a:ea typeface="Cambria Math" panose="02040503050406030204" pitchFamily="18" charset="0"/>
                               </a:rPr>
                             </m:ctrlPr>
@@ -4078,7 +4095,7 @@
                           <m:sSupPr>
                             <m:ctrlPr>
                               <a:rPr lang="en-US" sz="3200" i="1" dirty="0">
-                                <a:latin typeface="Cambria Math" panose="02040503050406030204" pitchFamily="18" charset="0"/>
+                                <a:latin typeface="Cambria Math"/>
                                 <a:ea typeface="Cambria Math" panose="02040503050406030204" pitchFamily="18" charset="0"/>
                               </a:rPr>
                             </m:ctrlPr>
@@ -4126,7 +4143,7 @@
                       <m:fPr>
                         <m:ctrlPr>
                           <a:rPr lang="en-US" sz="3200" i="1" dirty="0" smtClean="0">
-                            <a:latin typeface="Cambria Math" panose="02040503050406030204" pitchFamily="18" charset="0"/>
+                            <a:latin typeface="Cambria Math"/>
                             <a:ea typeface="Cambria Math" panose="02040503050406030204" pitchFamily="18" charset="0"/>
                           </a:rPr>
                         </m:ctrlPr>
@@ -4175,7 +4192,7 @@
                       <m:fPr>
                         <m:ctrlPr>
                           <a:rPr lang="en-US" sz="3200" b="0" i="1" dirty="0" smtClean="0">
-                            <a:latin typeface="Cambria Math" panose="02040503050406030204" pitchFamily="18" charset="0"/>
+                            <a:latin typeface="Cambria Math"/>
                             <a:ea typeface="Cambria Math" panose="02040503050406030204" pitchFamily="18" charset="0"/>
                           </a:rPr>
                         </m:ctrlPr>
@@ -4215,7 +4232,7 @@
                           <m:sSupPr>
                             <m:ctrlPr>
                               <a:rPr lang="en-US" sz="3200" b="0" i="1" dirty="0" smtClean="0">
-                                <a:latin typeface="Cambria Math" panose="02040503050406030204" pitchFamily="18" charset="0"/>
+                                <a:latin typeface="Cambria Math"/>
                                 <a:ea typeface="Cambria Math" panose="02040503050406030204" pitchFamily="18" charset="0"/>
                               </a:rPr>
                             </m:ctrlPr>
@@ -4263,7 +4280,7 @@
                       <m:fPr>
                         <m:ctrlPr>
                           <a:rPr lang="en-US" sz="3200" i="1" dirty="0">
-                            <a:latin typeface="Cambria Math" panose="02040503050406030204" pitchFamily="18" charset="0"/>
+                            <a:latin typeface="Cambria Math"/>
                             <a:ea typeface="Cambria Math" panose="02040503050406030204" pitchFamily="18" charset="0"/>
                           </a:rPr>
                         </m:ctrlPr>
@@ -4312,7 +4329,7 @@
                       <m:fPr>
                         <m:ctrlPr>
                           <a:rPr lang="en-US" sz="3200" i="1" dirty="0">
-                            <a:latin typeface="Cambria Math" panose="02040503050406030204" pitchFamily="18" charset="0"/>
+                            <a:latin typeface="Cambria Math"/>
                             <a:ea typeface="Cambria Math" panose="02040503050406030204" pitchFamily="18" charset="0"/>
                           </a:rPr>
                         </m:ctrlPr>
@@ -4345,7 +4362,7 @@
                           <m:sSupPr>
                             <m:ctrlPr>
                               <a:rPr lang="en-US" sz="3200" i="1" dirty="0">
-                                <a:latin typeface="Cambria Math" panose="02040503050406030204" pitchFamily="18" charset="0"/>
+                                <a:latin typeface="Cambria Math"/>
                                 <a:ea typeface="Cambria Math" panose="02040503050406030204" pitchFamily="18" charset="0"/>
                               </a:rPr>
                             </m:ctrlPr>
@@ -4380,7 +4397,7 @@
                           <m:sSupPr>
                             <m:ctrlPr>
                               <a:rPr lang="en-US" sz="3200" i="1" dirty="0">
-                                <a:latin typeface="Cambria Math" panose="02040503050406030204" pitchFamily="18" charset="0"/>
+                                <a:latin typeface="Cambria Math"/>
                                 <a:ea typeface="Cambria Math" panose="02040503050406030204" pitchFamily="18" charset="0"/>
                               </a:rPr>
                             </m:ctrlPr>
@@ -4424,7 +4441,7 @@
                       <m:fPr>
                         <m:ctrlPr>
                           <a:rPr lang="en-US" sz="3200" i="1" dirty="0">
-                            <a:latin typeface="Cambria Math" panose="02040503050406030204" pitchFamily="18" charset="0"/>
+                            <a:latin typeface="Cambria Math"/>
                             <a:ea typeface="Cambria Math" panose="02040503050406030204" pitchFamily="18" charset="0"/>
                           </a:rPr>
                         </m:ctrlPr>
@@ -4450,7 +4467,7 @@
                           <m:sSupPr>
                             <m:ctrlPr>
                               <a:rPr lang="en-US" sz="3200" i="1" dirty="0">
-                                <a:latin typeface="Cambria Math" panose="02040503050406030204" pitchFamily="18" charset="0"/>
+                                <a:latin typeface="Cambria Math"/>
                                 <a:ea typeface="Cambria Math" panose="02040503050406030204" pitchFamily="18" charset="0"/>
                               </a:rPr>
                             </m:ctrlPr>
@@ -4485,7 +4502,7 @@
                           <m:sSupPr>
                             <m:ctrlPr>
                               <a:rPr lang="en-US" sz="3200" i="1" dirty="0">
-                                <a:latin typeface="Cambria Math" panose="02040503050406030204" pitchFamily="18" charset="0"/>
+                                <a:latin typeface="Cambria Math"/>
                                 <a:ea typeface="Cambria Math" panose="02040503050406030204" pitchFamily="18" charset="0"/>
                               </a:rPr>
                             </m:ctrlPr>
@@ -4648,7 +4665,7 @@
                               <a:solidFill>
                                 <a:srgbClr val="7030A0"/>
                               </a:solidFill>
-                              <a:latin typeface="Cambria Math" panose="02040503050406030204" pitchFamily="18" charset="0"/>
+                              <a:latin typeface="Cambria Math"/>
                               <a:ea typeface="Cambria Math" panose="02040503050406030204" pitchFamily="18" charset="0"/>
                             </a:rPr>
                           </m:ctrlPr>
@@ -5264,7 +5281,7 @@
                             <a:solidFill>
                               <a:srgbClr val="C00000"/>
                             </a:solidFill>
-                            <a:latin typeface="Cambria Math" panose="02040503050406030204" pitchFamily="18" charset="0"/>
+                            <a:latin typeface="Cambria Math"/>
                           </a:rPr>
                         </m:ctrlPr>
                       </m:fPr>
@@ -5305,7 +5322,7 @@
                                 <a:solidFill>
                                   <a:srgbClr val="C00000"/>
                                 </a:solidFill>
-                                <a:latin typeface="Cambria Math" panose="02040503050406030204" pitchFamily="18" charset="0"/>
+                                <a:latin typeface="Cambria Math"/>
                               </a:rPr>
                             </m:ctrlPr>
                           </m:sSupPr>
@@ -5444,7 +5461,7 @@
                       <m:fPr>
                         <m:ctrlPr>
                           <a:rPr lang="en-US" sz="3200" i="1">
-                            <a:latin typeface="Cambria Math" panose="02040503050406030204" pitchFamily="18" charset="0"/>
+                            <a:latin typeface="Cambria Math"/>
                           </a:rPr>
                         </m:ctrlPr>
                       </m:fPr>
@@ -5473,7 +5490,7 @@
                           <m:sSupPr>
                             <m:ctrlPr>
                               <a:rPr lang="en-US" sz="3200" i="1">
-                                <a:latin typeface="Cambria Math" panose="02040503050406030204" pitchFamily="18" charset="0"/>
+                                <a:latin typeface="Cambria Math"/>
                               </a:rPr>
                             </m:ctrlPr>
                           </m:sSupPr>
@@ -5516,7 +5533,7 @@
                           <m:sSupPr>
                             <m:ctrlPr>
                               <a:rPr lang="en-US" sz="3200" i="1" smtClean="0">
-                                <a:latin typeface="Cambria Math" panose="02040503050406030204" pitchFamily="18" charset="0"/>
+                                <a:latin typeface="Cambria Math"/>
                               </a:rPr>
                             </m:ctrlPr>
                           </m:sSupPr>
@@ -5557,7 +5574,7 @@
                       <m:fPr>
                         <m:ctrlPr>
                           <a:rPr lang="en-US" sz="3200" i="1">
-                            <a:latin typeface="Cambria Math" panose="02040503050406030204" pitchFamily="18" charset="0"/>
+                            <a:latin typeface="Cambria Math"/>
                           </a:rPr>
                         </m:ctrlPr>
                       </m:fPr>
@@ -5572,7 +5589,7 @@
                           <m:dPr>
                             <m:ctrlPr>
                               <a:rPr lang="en-US" sz="3200" b="0" i="1" smtClean="0">
-                                <a:latin typeface="Cambria Math" panose="02040503050406030204" pitchFamily="18" charset="0"/>
+                                <a:latin typeface="Cambria Math"/>
                               </a:rPr>
                             </m:ctrlPr>
                           </m:dPr>
@@ -5609,7 +5626,7 @@
                           <m:sSupPr>
                             <m:ctrlPr>
                               <a:rPr lang="en-US" sz="3200" i="1">
-                                <a:latin typeface="Cambria Math" panose="02040503050406030204" pitchFamily="18" charset="0"/>
+                                <a:latin typeface="Cambria Math"/>
                               </a:rPr>
                             </m:ctrlPr>
                           </m:sSupPr>
@@ -5652,7 +5669,7 @@
                           <m:sSupPr>
                             <m:ctrlPr>
                               <a:rPr lang="en-US" sz="3200" i="1">
-                                <a:latin typeface="Cambria Math" panose="02040503050406030204" pitchFamily="18" charset="0"/>
+                                <a:latin typeface="Cambria Math"/>
                               </a:rPr>
                             </m:ctrlPr>
                           </m:sSupPr>
@@ -5698,7 +5715,7 @@
                             <a:solidFill>
                               <a:srgbClr val="FF0000"/>
                             </a:solidFill>
-                            <a:latin typeface="Cambria Math" panose="02040503050406030204" pitchFamily="18" charset="0"/>
+                            <a:latin typeface="Cambria Math"/>
                           </a:rPr>
                         </m:ctrlPr>
                       </m:fPr>
@@ -5741,7 +5758,7 @@
                                 <a:solidFill>
                                   <a:srgbClr val="FF0000"/>
                                 </a:solidFill>
-                                <a:latin typeface="Cambria Math" panose="02040503050406030204" pitchFamily="18" charset="0"/>
+                                <a:latin typeface="Cambria Math"/>
                               </a:rPr>
                             </m:ctrlPr>
                           </m:sSupPr>
@@ -5813,7 +5830,7 @@
                             <a:solidFill>
                               <a:srgbClr val="006600"/>
                             </a:solidFill>
-                            <a:latin typeface="Cambria Math" panose="02040503050406030204" pitchFamily="18" charset="0"/>
+                            <a:latin typeface="Cambria Math"/>
                           </a:rPr>
                         </m:ctrlPr>
                       </m:fPr>
@@ -5855,7 +5872,7 @@
                                 <a:solidFill>
                                   <a:srgbClr val="006600"/>
                                 </a:solidFill>
-                                <a:latin typeface="Cambria Math" panose="02040503050406030204" pitchFamily="18" charset="0"/>
+                                <a:latin typeface="Cambria Math"/>
                               </a:rPr>
                             </m:ctrlPr>
                           </m:sSupPr>
@@ -6020,7 +6037,7 @@
                             <a:solidFill>
                               <a:srgbClr val="C00000"/>
                             </a:solidFill>
-                            <a:latin typeface="Cambria Math" panose="02040503050406030204" pitchFamily="18" charset="0"/>
+                            <a:latin typeface="Cambria Math"/>
                           </a:rPr>
                         </m:ctrlPr>
                       </m:sSupPr>
@@ -6169,7 +6186,7 @@
                             <a:solidFill>
                               <a:srgbClr val="006600"/>
                             </a:solidFill>
-                            <a:latin typeface="Cambria Math" panose="02040503050406030204" pitchFamily="18" charset="0"/>
+                            <a:latin typeface="Cambria Math"/>
                             <a:ea typeface="Cambria Math" panose="02040503050406030204" pitchFamily="18" charset="0"/>
                           </a:rPr>
                         </m:ctrlPr>
@@ -6206,7 +6223,7 @@
                             <a:solidFill>
                               <a:srgbClr val="006600"/>
                             </a:solidFill>
-                            <a:latin typeface="Cambria Math" panose="02040503050406030204" pitchFamily="18" charset="0"/>
+                            <a:latin typeface="Cambria Math"/>
                             <a:ea typeface="Cambria Math" panose="02040503050406030204" pitchFamily="18" charset="0"/>
                           </a:rPr>
                         </m:ctrlPr>
@@ -6219,7 +6236,7 @@
                                 <a:solidFill>
                                   <a:srgbClr val="006600"/>
                                 </a:solidFill>
-                                <a:latin typeface="Cambria Math" panose="02040503050406030204" pitchFamily="18" charset="0"/>
+                                <a:latin typeface="Cambria Math"/>
                                 <a:ea typeface="Cambria Math" panose="02040503050406030204" pitchFamily="18" charset="0"/>
                               </a:rPr>
                             </m:ctrlPr>
@@ -6281,7 +6298,7 @@
                                 <a:solidFill>
                                   <a:srgbClr val="006600"/>
                                 </a:solidFill>
-                                <a:latin typeface="Cambria Math" panose="02040503050406030204" pitchFamily="18" charset="0"/>
+                                <a:latin typeface="Cambria Math"/>
                                 <a:ea typeface="Cambria Math" panose="02040503050406030204" pitchFamily="18" charset="0"/>
                               </a:rPr>
                             </m:ctrlPr>
@@ -6459,7 +6476,7 @@
           <p:cNvPr id="2" name="Oval 1">
             <a:extLst>
               <a:ext uri="{FF2B5EF4-FFF2-40B4-BE49-F238E27FC236}">
-                <a16:creationId xmlns:a16="http://schemas.microsoft.com/office/drawing/2014/main" id="{72358B84-3D39-49D4-B504-1E1DD6CA89A0}"/>
+                <a16:creationId xmlns:a16="http://schemas.microsoft.com/office/drawing/2014/main" xmlns="" id="{72358B84-3D39-49D4-B504-1E1DD6CA89A0}"/>
               </a:ext>
             </a:extLst>
           </p:cNvPr>
@@ -6506,7 +6523,7 @@
           <p:cNvPr id="7" name="Straight Arrow Connector 6">
             <a:extLst>
               <a:ext uri="{FF2B5EF4-FFF2-40B4-BE49-F238E27FC236}">
-                <a16:creationId xmlns:a16="http://schemas.microsoft.com/office/drawing/2014/main" id="{90B5FF96-12EA-4B5E-9E7C-692855811958}"/>
+                <a16:creationId xmlns:a16="http://schemas.microsoft.com/office/drawing/2014/main" xmlns="" id="{90B5FF96-12EA-4B5E-9E7C-692855811958}"/>
               </a:ext>
             </a:extLst>
           </p:cNvPr>
@@ -6550,7 +6567,7 @@
               <p:cNvPr id="8" name="TextBox 7">
                 <a:extLst>
                   <a:ext uri="{FF2B5EF4-FFF2-40B4-BE49-F238E27FC236}">
-                    <a16:creationId xmlns:a16="http://schemas.microsoft.com/office/drawing/2014/main" id="{44BFFDC4-4F19-4834-B222-AB852AE5C670}"/>
+                    <a16:creationId xmlns:a16="http://schemas.microsoft.com/office/drawing/2014/main" xmlns="" id="{44BFFDC4-4F19-4834-B222-AB852AE5C670}"/>
                   </a:ext>
                 </a:extLst>
               </p:cNvPr>
@@ -6598,7 +6615,7 @@
                               <a:solidFill>
                                 <a:srgbClr val="C00000"/>
                               </a:solidFill>
-                              <a:latin typeface="Cambria Math" panose="02040503050406030204" pitchFamily="18" charset="0"/>
+                              <a:latin typeface="Cambria Math"/>
                             </a:rPr>
                           </m:ctrlPr>
                         </m:sSubPr>
@@ -6659,7 +6676,7 @@
                               <a:solidFill>
                                 <a:srgbClr val="C00000"/>
                               </a:solidFill>
-                              <a:latin typeface="Cambria Math" panose="02040503050406030204" pitchFamily="18" charset="0"/>
+                              <a:latin typeface="Cambria Math"/>
                             </a:rPr>
                           </m:ctrlPr>
                         </m:fPr>
@@ -6699,7 +6716,7 @@
                                   <a:solidFill>
                                     <a:srgbClr val="C00000"/>
                                   </a:solidFill>
-                                  <a:latin typeface="Cambria Math" panose="02040503050406030204" pitchFamily="18" charset="0"/>
+                                  <a:latin typeface="Cambria Math"/>
                                 </a:rPr>
                               </m:ctrlPr>
                             </m:radPr>
@@ -6712,7 +6729,7 @@
                                       <a:solidFill>
                                         <a:srgbClr val="C00000"/>
                                       </a:solidFill>
-                                      <a:latin typeface="Cambria Math" panose="02040503050406030204" pitchFamily="18" charset="0"/>
+                                      <a:latin typeface="Cambria Math"/>
                                     </a:rPr>
                                   </m:ctrlPr>
                                 </m:sSupPr>
@@ -8191,7 +8208,7 @@
                             <a:solidFill>
                               <a:schemeClr val="tx1"/>
                             </a:solidFill>
-                            <a:latin typeface="Cambria Math" panose="02040503050406030204" pitchFamily="18" charset="0"/>
+                            <a:latin typeface="Cambria Math"/>
                             <a:ea typeface="Cambria Math" panose="02040503050406030204" pitchFamily="18" charset="0"/>
                           </a:rPr>
                         </m:ctrlPr>
@@ -8204,7 +8221,7 @@
                                 <a:solidFill>
                                   <a:schemeClr val="tx1"/>
                                 </a:solidFill>
-                                <a:latin typeface="Cambria Math" panose="02040503050406030204" pitchFamily="18" charset="0"/>
+                                <a:latin typeface="Cambria Math"/>
                                 <a:ea typeface="Cambria Math" panose="02040503050406030204" pitchFamily="18" charset="0"/>
                               </a:rPr>
                             </m:ctrlPr>
@@ -8313,7 +8330,7 @@
                                 <a:solidFill>
                                   <a:schemeClr val="tx1"/>
                                 </a:solidFill>
-                                <a:latin typeface="Cambria Math" panose="02040503050406030204" pitchFamily="18" charset="0"/>
+                                <a:latin typeface="Cambria Math"/>
                                 <a:ea typeface="Cambria Math" panose="02040503050406030204" pitchFamily="18" charset="0"/>
                               </a:rPr>
                             </m:ctrlPr>
@@ -8516,7 +8533,7 @@
                             <a:solidFill>
                               <a:srgbClr val="C00000"/>
                             </a:solidFill>
-                            <a:latin typeface="Cambria Math" panose="02040503050406030204" pitchFamily="18" charset="0"/>
+                            <a:latin typeface="Cambria Math"/>
                             <a:ea typeface="Cambria Math" panose="02040503050406030204" pitchFamily="18" charset="0"/>
                           </a:rPr>
                         </m:ctrlPr>
@@ -8529,7 +8546,7 @@
                                 <a:solidFill>
                                   <a:srgbClr val="C00000"/>
                                 </a:solidFill>
-                                <a:latin typeface="Cambria Math" panose="02040503050406030204" pitchFamily="18" charset="0"/>
+                                <a:latin typeface="Cambria Math"/>
                                 <a:ea typeface="Cambria Math" panose="02040503050406030204" pitchFamily="18" charset="0"/>
                               </a:rPr>
                             </m:ctrlPr>
@@ -8678,7 +8695,7 @@
                                 <a:solidFill>
                                   <a:srgbClr val="C00000"/>
                                 </a:solidFill>
-                                <a:latin typeface="Cambria Math" panose="02040503050406030204" pitchFamily="18" charset="0"/>
+                                <a:latin typeface="Cambria Math"/>
                                 <a:ea typeface="Cambria Math" panose="02040503050406030204" pitchFamily="18" charset="0"/>
                               </a:rPr>
                             </m:ctrlPr>
@@ -8761,7 +8778,7 @@
                             <a:solidFill>
                               <a:srgbClr val="C00000"/>
                             </a:solidFill>
-                            <a:latin typeface="Cambria Math" panose="02040503050406030204" pitchFamily="18" charset="0"/>
+                            <a:latin typeface="Cambria Math"/>
                             <a:ea typeface="Cambria Math" panose="02040503050406030204" pitchFamily="18" charset="0"/>
                           </a:rPr>
                         </m:ctrlPr>
@@ -8848,7 +8865,7 @@
                             <a:solidFill>
                               <a:srgbClr val="C00000"/>
                             </a:solidFill>
-                            <a:latin typeface="Cambria Math" panose="02040503050406030204" pitchFamily="18" charset="0"/>
+                            <a:latin typeface="Cambria Math"/>
                             <a:ea typeface="Cambria Math" panose="02040503050406030204" pitchFamily="18" charset="0"/>
                           </a:rPr>
                         </m:ctrlPr>
@@ -8903,7 +8920,7 @@
                                 <a:solidFill>
                                   <a:srgbClr val="C00000"/>
                                 </a:solidFill>
-                                <a:latin typeface="Cambria Math" panose="02040503050406030204" pitchFamily="18" charset="0"/>
+                                <a:latin typeface="Cambria Math"/>
                                 <a:ea typeface="Cambria Math" panose="02040503050406030204" pitchFamily="18" charset="0"/>
                               </a:rPr>
                             </m:ctrlPr>
@@ -9075,7 +9092,7 @@
                             <a:solidFill>
                               <a:schemeClr val="tx1"/>
                             </a:solidFill>
-                            <a:latin typeface="Cambria Math" panose="02040503050406030204" pitchFamily="18" charset="0"/>
+                            <a:latin typeface="Cambria Math"/>
                             <a:ea typeface="Cambria Math" panose="02040503050406030204" pitchFamily="18" charset="0"/>
                           </a:rPr>
                         </m:ctrlPr>
@@ -9088,7 +9105,7 @@
                                 <a:solidFill>
                                   <a:schemeClr val="tx1"/>
                                 </a:solidFill>
-                                <a:latin typeface="Cambria Math" panose="02040503050406030204" pitchFamily="18" charset="0"/>
+                                <a:latin typeface="Cambria Math"/>
                                 <a:ea typeface="Cambria Math" panose="02040503050406030204" pitchFamily="18" charset="0"/>
                               </a:rPr>
                             </m:ctrlPr>
@@ -9227,7 +9244,7 @@
                                 <a:solidFill>
                                   <a:schemeClr val="tx1"/>
                                 </a:solidFill>
-                                <a:latin typeface="Cambria Math" panose="02040503050406030204" pitchFamily="18" charset="0"/>
+                                <a:latin typeface="Cambria Math"/>
                                 <a:ea typeface="Cambria Math" panose="02040503050406030204" pitchFamily="18" charset="0"/>
                               </a:rPr>
                             </m:ctrlPr>
@@ -9418,7 +9435,7 @@
                             <a:solidFill>
                               <a:schemeClr val="tx1"/>
                             </a:solidFill>
-                            <a:latin typeface="Cambria Math" panose="02040503050406030204" pitchFamily="18" charset="0"/>
+                            <a:latin typeface="Cambria Math"/>
                             <a:ea typeface="Cambria Math" panose="02040503050406030204" pitchFamily="18" charset="0"/>
                           </a:rPr>
                         </m:ctrlPr>
@@ -9428,7 +9445,7 @@
                           <m:fPr>
                             <m:ctrlPr>
                               <a:rPr lang="en-US" sz="2600" b="1" i="1" dirty="0">
-                                <a:latin typeface="Cambria Math" panose="02040503050406030204" pitchFamily="18" charset="0"/>
+                                <a:latin typeface="Cambria Math"/>
                                 <a:ea typeface="Cambria Math" panose="02040503050406030204" pitchFamily="18" charset="0"/>
                               </a:rPr>
                             </m:ctrlPr>
@@ -9438,7 +9455,7 @@
                               <m:sSupPr>
                                 <m:ctrlPr>
                                   <a:rPr lang="en-US" sz="2600" b="1" i="1" dirty="0">
-                                    <a:latin typeface="Cambria Math" panose="02040503050406030204" pitchFamily="18" charset="0"/>
+                                    <a:latin typeface="Cambria Math"/>
                                     <a:ea typeface="Cambria Math" panose="02040503050406030204" pitchFamily="18" charset="0"/>
                                   </a:rPr>
                                 </m:ctrlPr>
@@ -9545,7 +9562,7 @@
                               <m:sSupPr>
                                 <m:ctrlPr>
                                   <a:rPr lang="en-US" sz="2600" b="1" i="1" dirty="0">
-                                    <a:latin typeface="Cambria Math" panose="02040503050406030204" pitchFamily="18" charset="0"/>
+                                    <a:latin typeface="Cambria Math"/>
                                     <a:ea typeface="Cambria Math" panose="02040503050406030204" pitchFamily="18" charset="0"/>
                                   </a:rPr>
                                 </m:ctrlPr>
@@ -9645,7 +9662,7 @@
                             <a:solidFill>
                               <a:schemeClr val="tx1"/>
                             </a:solidFill>
-                            <a:latin typeface="Cambria Math" panose="02040503050406030204" pitchFamily="18" charset="0"/>
+                            <a:latin typeface="Cambria Math"/>
                             <a:ea typeface="Cambria Math" panose="02040503050406030204" pitchFamily="18" charset="0"/>
                           </a:rPr>
                         </m:ctrlPr>
@@ -9847,7 +9864,7 @@
                             <a:solidFill>
                               <a:prstClr val="black"/>
                             </a:solidFill>
-                            <a:latin typeface="Cambria Math" panose="02040503050406030204" pitchFamily="18" charset="0"/>
+                            <a:latin typeface="Cambria Math"/>
                             <a:ea typeface="Cambria Math" panose="02040503050406030204" pitchFamily="18" charset="0"/>
                           </a:rPr>
                         </m:ctrlPr>
@@ -9860,7 +9877,7 @@
                                 <a:solidFill>
                                   <a:prstClr val="black"/>
                                 </a:solidFill>
-                                <a:latin typeface="Cambria Math" panose="02040503050406030204" pitchFamily="18" charset="0"/>
+                                <a:latin typeface="Cambria Math"/>
                                 <a:ea typeface="Cambria Math" panose="02040503050406030204" pitchFamily="18" charset="0"/>
                               </a:rPr>
                             </m:ctrlPr>
@@ -9919,7 +9936,7 @@
                                 <a:solidFill>
                                   <a:prstClr val="black"/>
                                 </a:solidFill>
-                                <a:latin typeface="Cambria Math" panose="02040503050406030204" pitchFamily="18" charset="0"/>
+                                <a:latin typeface="Cambria Math"/>
                                 <a:ea typeface="Cambria Math" panose="02040503050406030204" pitchFamily="18" charset="0"/>
                               </a:rPr>
                             </m:ctrlPr>
@@ -9982,7 +9999,7 @@
                             <a:solidFill>
                               <a:prstClr val="black"/>
                             </a:solidFill>
-                            <a:latin typeface="Cambria Math" panose="02040503050406030204" pitchFamily="18" charset="0"/>
+                            <a:latin typeface="Cambria Math"/>
                             <a:ea typeface="Cambria Math" panose="02040503050406030204" pitchFamily="18" charset="0"/>
                           </a:rPr>
                         </m:ctrlPr>
@@ -10029,7 +10046,7 @@
                             <a:solidFill>
                               <a:prstClr val="black"/>
                             </a:solidFill>
-                            <a:latin typeface="Cambria Math" panose="02040503050406030204" pitchFamily="18" charset="0"/>
+                            <a:latin typeface="Cambria Math"/>
                             <a:ea typeface="Cambria Math" panose="02040503050406030204" pitchFamily="18" charset="0"/>
                           </a:rPr>
                         </m:ctrlPr>
@@ -10220,7 +10237,7 @@
                             <a:solidFill>
                               <a:schemeClr val="tx1"/>
                             </a:solidFill>
-                            <a:latin typeface="Cambria Math" panose="02040503050406030204" pitchFamily="18" charset="0"/>
+                            <a:latin typeface="Cambria Math"/>
                             <a:ea typeface="Cambria Math" panose="02040503050406030204" pitchFamily="18" charset="0"/>
                           </a:rPr>
                         </m:ctrlPr>
@@ -10233,7 +10250,7 @@
                                 <a:solidFill>
                                   <a:schemeClr val="tx1"/>
                                 </a:solidFill>
-                                <a:latin typeface="Cambria Math" panose="02040503050406030204" pitchFamily="18" charset="0"/>
+                                <a:latin typeface="Cambria Math"/>
                                 <a:ea typeface="Cambria Math" panose="02040503050406030204" pitchFamily="18" charset="0"/>
                               </a:rPr>
                             </m:ctrlPr>
@@ -10342,7 +10359,7 @@
                                 <a:solidFill>
                                   <a:schemeClr val="tx1"/>
                                 </a:solidFill>
-                                <a:latin typeface="Cambria Math" panose="02040503050406030204" pitchFamily="18" charset="0"/>
+                                <a:latin typeface="Cambria Math"/>
                                 <a:ea typeface="Cambria Math" panose="02040503050406030204" pitchFamily="18" charset="0"/>
                               </a:rPr>
                             </m:ctrlPr>
@@ -10415,7 +10432,7 @@
                             <a:solidFill>
                               <a:schemeClr val="tx1"/>
                             </a:solidFill>
-                            <a:latin typeface="Cambria Math" panose="02040503050406030204" pitchFamily="18" charset="0"/>
+                            <a:latin typeface="Cambria Math"/>
                             <a:ea typeface="Cambria Math" panose="02040503050406030204" pitchFamily="18" charset="0"/>
                           </a:rPr>
                         </m:ctrlPr>
@@ -10482,7 +10499,7 @@
                             <a:solidFill>
                               <a:schemeClr val="tx1"/>
                             </a:solidFill>
-                            <a:latin typeface="Cambria Math" panose="02040503050406030204" pitchFamily="18" charset="0"/>
+                            <a:latin typeface="Cambria Math"/>
                             <a:ea typeface="Cambria Math" panose="02040503050406030204" pitchFamily="18" charset="0"/>
                           </a:rPr>
                         </m:ctrlPr>
@@ -10531,7 +10548,7 @@
                           <m:sSupPr>
                             <m:ctrlPr>
                               <a:rPr lang="en-US" sz="3200" i="1" dirty="0">
-                                <a:latin typeface="Cambria Math" panose="02040503050406030204" pitchFamily="18" charset="0"/>
+                                <a:latin typeface="Cambria Math"/>
                                 <a:ea typeface="Cambria Math" panose="02040503050406030204" pitchFamily="18" charset="0"/>
                               </a:rPr>
                             </m:ctrlPr>
@@ -10581,7 +10598,7 @@
                             <a:solidFill>
                               <a:srgbClr val="006600"/>
                             </a:solidFill>
-                            <a:latin typeface="Cambria Math" panose="02040503050406030204" pitchFamily="18" charset="0"/>
+                            <a:latin typeface="Cambria Math"/>
                             <a:ea typeface="Cambria Math" panose="02040503050406030204" pitchFamily="18" charset="0"/>
                           </a:rPr>
                         </m:ctrlPr>
@@ -10668,7 +10685,7 @@
                             <a:solidFill>
                               <a:srgbClr val="006600"/>
                             </a:solidFill>
-                            <a:latin typeface="Cambria Math" panose="02040503050406030204" pitchFamily="18" charset="0"/>
+                            <a:latin typeface="Cambria Math"/>
                             <a:ea typeface="Cambria Math" panose="02040503050406030204" pitchFamily="18" charset="0"/>
                           </a:rPr>
                         </m:ctrlPr>
@@ -10713,7 +10730,7 @@
                                 <a:solidFill>
                                   <a:srgbClr val="006600"/>
                                 </a:solidFill>
-                                <a:latin typeface="Cambria Math" panose="02040503050406030204" pitchFamily="18" charset="0"/>
+                                <a:latin typeface="Cambria Math"/>
                                 <a:ea typeface="Cambria Math" panose="02040503050406030204" pitchFamily="18" charset="0"/>
                               </a:rPr>
                             </m:ctrlPr>
@@ -10792,7 +10809,7 @@
                             <a:solidFill>
                               <a:srgbClr val="006600"/>
                             </a:solidFill>
-                            <a:latin typeface="Cambria Math" panose="02040503050406030204" pitchFamily="18" charset="0"/>
+                            <a:latin typeface="Cambria Math"/>
                             <a:ea typeface="Cambria Math" panose="02040503050406030204" pitchFamily="18" charset="0"/>
                           </a:rPr>
                         </m:ctrlPr>
@@ -10827,7 +10844,7 @@
                                 <a:solidFill>
                                   <a:srgbClr val="006600"/>
                                 </a:solidFill>
-                                <a:latin typeface="Cambria Math" panose="02040503050406030204" pitchFamily="18" charset="0"/>
+                                <a:latin typeface="Cambria Math"/>
                                 <a:ea typeface="Cambria Math" panose="02040503050406030204" pitchFamily="18" charset="0"/>
                               </a:rPr>
                             </m:ctrlPr>
@@ -11027,7 +11044,7 @@
                             <a:solidFill>
                               <a:srgbClr val="7030A0"/>
                             </a:solidFill>
-                            <a:latin typeface="Cambria Math" panose="02040503050406030204" pitchFamily="18" charset="0"/>
+                            <a:latin typeface="Cambria Math"/>
                             <a:ea typeface="Cambria Math" panose="02040503050406030204" pitchFamily="18" charset="0"/>
                           </a:rPr>
                         </m:ctrlPr>
@@ -11586,7 +11603,7 @@
                             <a:solidFill>
                               <a:schemeClr val="tx1"/>
                             </a:solidFill>
-                            <a:latin typeface="Cambria Math" panose="02040503050406030204" pitchFamily="18" charset="0"/>
+                            <a:latin typeface="Cambria Math"/>
                             <a:ea typeface="Cambria Math" panose="02040503050406030204" pitchFamily="18" charset="0"/>
                           </a:rPr>
                         </m:ctrlPr>
@@ -11667,7 +11684,7 @@
                             <a:solidFill>
                               <a:schemeClr val="tx1"/>
                             </a:solidFill>
-                            <a:latin typeface="Cambria Math" panose="02040503050406030204" pitchFamily="18" charset="0"/>
+                            <a:latin typeface="Cambria Math"/>
                             <a:ea typeface="Cambria Math" panose="02040503050406030204" pitchFamily="18" charset="0"/>
                           </a:rPr>
                         </m:ctrlPr>
@@ -11835,7 +11852,7 @@
                             <a:solidFill>
                               <a:schemeClr val="tx1"/>
                             </a:solidFill>
-                            <a:latin typeface="Cambria Math" panose="02040503050406030204" pitchFamily="18" charset="0"/>
+                            <a:latin typeface="Cambria Math"/>
                             <a:ea typeface="Cambria Math" panose="02040503050406030204" pitchFamily="18" charset="0"/>
                           </a:rPr>
                         </m:ctrlPr>
@@ -11889,7 +11906,7 @@
                       <m:naryPr>
                         <m:ctrlPr>
                           <a:rPr lang="en-US" sz="3200" i="1" smtClean="0">
-                            <a:latin typeface="Cambria Math" panose="02040503050406030204" pitchFamily="18" charset="0"/>
+                            <a:latin typeface="Cambria Math"/>
                             <a:ea typeface="Cambria Math" panose="02040503050406030204" pitchFamily="18" charset="0"/>
                           </a:rPr>
                         </m:ctrlPr>
@@ -11899,7 +11916,7 @@
                           <m:sSupPr>
                             <m:ctrlPr>
                               <a:rPr lang="en-US" sz="3200" i="1">
-                                <a:latin typeface="Cambria Math" panose="02040503050406030204" pitchFamily="18" charset="0"/>
+                                <a:latin typeface="Cambria Math"/>
                                 <a:ea typeface="Cambria Math" panose="02040503050406030204" pitchFamily="18" charset="0"/>
                               </a:rPr>
                             </m:ctrlPr>
@@ -11938,7 +11955,7 @@
                           <m:dPr>
                             <m:ctrlPr>
                               <a:rPr lang="en-US" sz="3200" i="1" smtClean="0">
-                                <a:latin typeface="Cambria Math" panose="02040503050406030204" pitchFamily="18" charset="0"/>
+                                <a:latin typeface="Cambria Math"/>
                                 <a:ea typeface="Cambria Math" panose="02040503050406030204" pitchFamily="18" charset="0"/>
                               </a:rPr>
                             </m:ctrlPr>
@@ -11948,7 +11965,7 @@
                               <m:fPr>
                                 <m:ctrlPr>
                                   <a:rPr lang="en-US" sz="3200" i="1" smtClean="0">
-                                    <a:latin typeface="Cambria Math" panose="02040503050406030204" pitchFamily="18" charset="0"/>
+                                    <a:latin typeface="Cambria Math"/>
                                     <a:ea typeface="Cambria Math" panose="02040503050406030204" pitchFamily="18" charset="0"/>
                                   </a:rPr>
                                 </m:ctrlPr>
@@ -12068,7 +12085,7 @@
                             <a:solidFill>
                               <a:schemeClr val="tx1"/>
                             </a:solidFill>
-                            <a:latin typeface="Cambria Math" panose="02040503050406030204" pitchFamily="18" charset="0"/>
+                            <a:latin typeface="Cambria Math"/>
                             <a:ea typeface="Cambria Math" panose="02040503050406030204" pitchFamily="18" charset="0"/>
                           </a:rPr>
                         </m:ctrlPr>
@@ -12083,7 +12100,7 @@
                                 <a:solidFill>
                                   <a:schemeClr val="tx1"/>
                                 </a:solidFill>
-                                <a:latin typeface="Cambria Math" panose="02040503050406030204" pitchFamily="18" charset="0"/>
+                                <a:latin typeface="Cambria Math"/>
                                 <a:ea typeface="Cambria Math" panose="02040503050406030204" pitchFamily="18" charset="0"/>
                               </a:rPr>
                             </m:ctrlPr>
@@ -12167,7 +12184,7 @@
                                 <a:solidFill>
                                   <a:schemeClr val="tx1"/>
                                 </a:solidFill>
-                                <a:latin typeface="Cambria Math" panose="02040503050406030204" pitchFamily="18" charset="0"/>
+                                <a:latin typeface="Cambria Math"/>
                                 <a:ea typeface="Cambria Math" panose="02040503050406030204" pitchFamily="18" charset="0"/>
                               </a:rPr>
                             </m:ctrlPr>
@@ -12225,7 +12242,7 @@
                       <m:naryPr>
                         <m:ctrlPr>
                           <a:rPr lang="en-US" sz="3200" i="1">
-                            <a:latin typeface="Cambria Math" panose="02040503050406030204" pitchFamily="18" charset="0"/>
+                            <a:latin typeface="Cambria Math"/>
                             <a:ea typeface="Cambria Math" panose="02040503050406030204" pitchFamily="18" charset="0"/>
                           </a:rPr>
                         </m:ctrlPr>
@@ -12235,7 +12252,7 @@
                           <m:sSupPr>
                             <m:ctrlPr>
                               <a:rPr lang="en-US" sz="3200" i="1">
-                                <a:latin typeface="Cambria Math" panose="02040503050406030204" pitchFamily="18" charset="0"/>
+                                <a:latin typeface="Cambria Math"/>
                                 <a:ea typeface="Cambria Math" panose="02040503050406030204" pitchFamily="18" charset="0"/>
                               </a:rPr>
                             </m:ctrlPr>
@@ -12274,7 +12291,7 @@
                           <m:dPr>
                             <m:ctrlPr>
                               <a:rPr lang="en-US" sz="3200" b="0" i="1" smtClean="0">
-                                <a:latin typeface="Cambria Math" panose="02040503050406030204" pitchFamily="18" charset="0"/>
+                                <a:latin typeface="Cambria Math"/>
                                 <a:ea typeface="Cambria Math" panose="02040503050406030204" pitchFamily="18" charset="0"/>
                               </a:rPr>
                             </m:ctrlPr>
@@ -12461,7 +12478,7 @@
                             <a:solidFill>
                               <a:schemeClr val="tx1"/>
                             </a:solidFill>
-                            <a:latin typeface="Cambria Math" panose="02040503050406030204" pitchFamily="18" charset="0"/>
+                            <a:latin typeface="Cambria Math"/>
                             <a:ea typeface="Cambria Math" panose="02040503050406030204" pitchFamily="18" charset="0"/>
                           </a:rPr>
                         </m:ctrlPr>
@@ -12518,7 +12535,7 @@
                             <a:solidFill>
                               <a:schemeClr val="tx1"/>
                             </a:solidFill>
-                            <a:latin typeface="Cambria Math" panose="02040503050406030204" pitchFamily="18" charset="0"/>
+                            <a:latin typeface="Cambria Math"/>
                             <a:ea typeface="Cambria Math" panose="02040503050406030204" pitchFamily="18" charset="0"/>
                           </a:rPr>
                         </m:ctrlPr>
@@ -12563,7 +12580,7 @@
                             <a:solidFill>
                               <a:schemeClr val="tx1"/>
                             </a:solidFill>
-                            <a:latin typeface="Cambria Math" panose="02040503050406030204" pitchFamily="18" charset="0"/>
+                            <a:latin typeface="Cambria Math"/>
                             <a:ea typeface="Cambria Math" panose="02040503050406030204" pitchFamily="18" charset="0"/>
                           </a:rPr>
                         </m:ctrlPr>
@@ -12615,7 +12632,7 @@
                       <m:sSupPr>
                         <m:ctrlPr>
                           <a:rPr lang="en-US" sz="3200" i="1">
-                            <a:latin typeface="Cambria Math" panose="02040503050406030204" pitchFamily="18" charset="0"/>
+                            <a:latin typeface="Cambria Math"/>
                             <a:ea typeface="Cambria Math" panose="02040503050406030204" pitchFamily="18" charset="0"/>
                           </a:rPr>
                         </m:ctrlPr>
@@ -12823,7 +12840,7 @@
                       <m:sSubPr>
                         <m:ctrlPr>
                           <a:rPr lang="en-US" sz="3200" b="1" i="1" smtClean="0">
-                            <a:latin typeface="Cambria Math" panose="02040503050406030204" pitchFamily="18" charset="0"/>
+                            <a:latin typeface="Cambria Math"/>
                             <a:ea typeface="Cambria Math" panose="02040503050406030204" pitchFamily="18" charset="0"/>
                           </a:rPr>
                         </m:ctrlPr>
@@ -12879,7 +12896,7 @@
                       <m:fPr>
                         <m:ctrlPr>
                           <a:rPr lang="en-US" sz="3200" b="1" i="1" smtClean="0">
-                            <a:latin typeface="Cambria Math" panose="02040503050406030204" pitchFamily="18" charset="0"/>
+                            <a:latin typeface="Cambria Math"/>
                             <a:ea typeface="Cambria Math" panose="02040503050406030204" pitchFamily="18" charset="0"/>
                           </a:rPr>
                         </m:ctrlPr>
@@ -12889,7 +12906,7 @@
                           <m:sSubPr>
                             <m:ctrlPr>
                               <a:rPr lang="en-US" sz="3200" b="1" i="1" smtClean="0">
-                                <a:latin typeface="Cambria Math" panose="02040503050406030204" pitchFamily="18" charset="0"/>
+                                <a:latin typeface="Cambria Math"/>
                                 <a:ea typeface="Cambria Math" panose="02040503050406030204" pitchFamily="18" charset="0"/>
                               </a:rPr>
                             </m:ctrlPr>
@@ -13062,7 +13079,7 @@
                         <m:sSubPr>
                           <m:ctrlPr>
                             <a:rPr lang="en-US" sz="2800" b="1" i="1" smtClean="0">
-                              <a:latin typeface="Cambria Math" panose="02040503050406030204" pitchFamily="18" charset="0"/>
+                              <a:latin typeface="Cambria Math"/>
                               <a:ea typeface="Cambria Math" panose="02040503050406030204" pitchFamily="18" charset="0"/>
                             </a:rPr>
                           </m:ctrlPr>
@@ -13118,7 +13135,7 @@
                         <m:sSubPr>
                           <m:ctrlPr>
                             <a:rPr lang="en-US" sz="2800" b="1" i="1" smtClean="0">
-                              <a:latin typeface="Cambria Math" panose="02040503050406030204" pitchFamily="18" charset="0"/>
+                              <a:latin typeface="Cambria Math"/>
                               <a:ea typeface="Cambria Math" panose="02040503050406030204" pitchFamily="18" charset="0"/>
                             </a:rPr>
                           </m:ctrlPr>
@@ -13146,7 +13163,7 @@
                         <m:dPr>
                           <m:ctrlPr>
                             <a:rPr lang="en-US" sz="2800" b="1" i="1" smtClean="0">
-                              <a:latin typeface="Cambria Math" panose="02040503050406030204" pitchFamily="18" charset="0"/>
+                              <a:latin typeface="Cambria Math"/>
                               <a:ea typeface="Cambria Math" panose="02040503050406030204" pitchFamily="18" charset="0"/>
                             </a:rPr>
                           </m:ctrlPr>
@@ -13179,7 +13196,7 @@
                         <m:sSubPr>
                           <m:ctrlPr>
                             <a:rPr lang="en-US" sz="2800" b="1" i="1" smtClean="0">
-                              <a:latin typeface="Cambria Math" panose="02040503050406030204" pitchFamily="18" charset="0"/>
+                              <a:latin typeface="Cambria Math"/>
                               <a:ea typeface="Cambria Math" panose="02040503050406030204" pitchFamily="18" charset="0"/>
                             </a:rPr>
                           </m:ctrlPr>
@@ -13214,7 +13231,7 @@
                         <m:sSupPr>
                           <m:ctrlPr>
                             <a:rPr lang="en-US" sz="2800" b="1" i="1" smtClean="0">
-                              <a:latin typeface="Cambria Math" panose="02040503050406030204" pitchFamily="18" charset="0"/>
+                              <a:latin typeface="Cambria Math"/>
                               <a:ea typeface="Cambria Math" panose="02040503050406030204" pitchFamily="18" charset="0"/>
                             </a:rPr>
                           </m:ctrlPr>
@@ -13450,7 +13467,7 @@
                             <a:solidFill>
                               <a:schemeClr val="tx1"/>
                             </a:solidFill>
-                            <a:latin typeface="Cambria Math" panose="02040503050406030204" pitchFamily="18" charset="0"/>
+                            <a:latin typeface="Cambria Math"/>
                             <a:ea typeface="Cambria Math" panose="02040503050406030204" pitchFamily="18" charset="0"/>
                           </a:rPr>
                         </m:ctrlPr>
@@ -13463,7 +13480,7 @@
                                 <a:solidFill>
                                   <a:schemeClr val="tx1"/>
                                 </a:solidFill>
-                                <a:latin typeface="Cambria Math" panose="02040503050406030204" pitchFamily="18" charset="0"/>
+                                <a:latin typeface="Cambria Math"/>
                                 <a:ea typeface="Cambria Math" panose="02040503050406030204" pitchFamily="18" charset="0"/>
                               </a:rPr>
                             </m:ctrlPr>
@@ -13512,7 +13529,7 @@
                                 <a:solidFill>
                                   <a:schemeClr val="tx1"/>
                                 </a:solidFill>
-                                <a:latin typeface="Cambria Math" panose="02040503050406030204" pitchFamily="18" charset="0"/>
+                                <a:latin typeface="Cambria Math"/>
                                 <a:ea typeface="Cambria Math" panose="02040503050406030204" pitchFamily="18" charset="0"/>
                               </a:rPr>
                             </m:ctrlPr>
@@ -13565,7 +13582,7 @@
                             <a:solidFill>
                               <a:schemeClr val="tx1"/>
                             </a:solidFill>
-                            <a:latin typeface="Cambria Math" panose="02040503050406030204" pitchFamily="18" charset="0"/>
+                            <a:latin typeface="Cambria Math"/>
                             <a:ea typeface="Cambria Math" panose="02040503050406030204" pitchFamily="18" charset="0"/>
                           </a:rPr>
                         </m:ctrlPr>
@@ -13623,7 +13640,7 @@
                       <m:sSupPr>
                         <m:ctrlPr>
                           <a:rPr lang="en-US" sz="2800" i="1" dirty="0">
-                            <a:latin typeface="Cambria Math" panose="02040503050406030204" pitchFamily="18" charset="0"/>
+                            <a:latin typeface="Cambria Math"/>
                             <a:ea typeface="Cambria Math" panose="02040503050406030204" pitchFamily="18" charset="0"/>
                           </a:rPr>
                         </m:ctrlPr>
@@ -13689,7 +13706,7 @@
                             <a:solidFill>
                               <a:schemeClr val="tx1"/>
                             </a:solidFill>
-                            <a:latin typeface="Cambria Math" panose="02040503050406030204" pitchFamily="18" charset="0"/>
+                            <a:latin typeface="Cambria Math"/>
                             <a:ea typeface="Cambria Math" panose="02040503050406030204" pitchFamily="18" charset="0"/>
                           </a:rPr>
                         </m:ctrlPr>
@@ -13733,7 +13750,7 @@
                       <m:sSupPr>
                         <m:ctrlPr>
                           <a:rPr lang="en-US" sz="2800" i="1" dirty="0">
-                            <a:latin typeface="Cambria Math" panose="02040503050406030204" pitchFamily="18" charset="0"/>
+                            <a:latin typeface="Cambria Math"/>
                             <a:ea typeface="Cambria Math" panose="02040503050406030204" pitchFamily="18" charset="0"/>
                           </a:rPr>
                         </m:ctrlPr>
@@ -13779,7 +13796,7 @@
                             <a:solidFill>
                               <a:schemeClr val="tx1"/>
                             </a:solidFill>
-                            <a:latin typeface="Cambria Math" panose="02040503050406030204" pitchFamily="18" charset="0"/>
+                            <a:latin typeface="Cambria Math"/>
                             <a:ea typeface="Cambria Math" panose="02040503050406030204" pitchFamily="18" charset="0"/>
                           </a:rPr>
                         </m:ctrlPr>
@@ -13811,7 +13828,7 @@
                       <m:sSupPr>
                         <m:ctrlPr>
                           <a:rPr lang="en-US" sz="2800" i="1">
-                            <a:latin typeface="Cambria Math" panose="02040503050406030204" pitchFamily="18" charset="0"/>
+                            <a:latin typeface="Cambria Math"/>
                             <a:ea typeface="Cambria Math" panose="02040503050406030204" pitchFamily="18" charset="0"/>
                           </a:rPr>
                         </m:ctrlPr>
@@ -13853,7 +13870,7 @@
                       <m:sSupPr>
                         <m:ctrlPr>
                           <a:rPr lang="en-US" sz="2800" i="1" dirty="0">
-                            <a:latin typeface="Cambria Math" panose="02040503050406030204" pitchFamily="18" charset="0"/>
+                            <a:latin typeface="Cambria Math"/>
                             <a:ea typeface="Cambria Math" panose="02040503050406030204" pitchFamily="18" charset="0"/>
                           </a:rPr>
                         </m:ctrlPr>
@@ -13905,7 +13922,7 @@
                       <m:sSupPr>
                         <m:ctrlPr>
                           <a:rPr lang="en-US" sz="2800" i="1">
-                            <a:latin typeface="Cambria Math" panose="02040503050406030204" pitchFamily="18" charset="0"/>
+                            <a:latin typeface="Cambria Math"/>
                             <a:ea typeface="Cambria Math" panose="02040503050406030204" pitchFamily="18" charset="0"/>
                           </a:rPr>
                         </m:ctrlPr>
@@ -14030,7 +14047,7 @@
                             <a:solidFill>
                               <a:schemeClr val="tx1"/>
                             </a:solidFill>
-                            <a:latin typeface="Cambria Math" panose="02040503050406030204" pitchFamily="18" charset="0"/>
+                            <a:latin typeface="Cambria Math"/>
                             <a:ea typeface="Cambria Math" panose="02040503050406030204" pitchFamily="18" charset="0"/>
                           </a:rPr>
                         </m:ctrlPr>
@@ -14043,7 +14060,7 @@
                                 <a:solidFill>
                                   <a:schemeClr val="tx1"/>
                                 </a:solidFill>
-                                <a:latin typeface="Cambria Math" panose="02040503050406030204" pitchFamily="18" charset="0"/>
+                                <a:latin typeface="Cambria Math"/>
                                 <a:ea typeface="Cambria Math" panose="02040503050406030204" pitchFamily="18" charset="0"/>
                               </a:rPr>
                             </m:ctrlPr>
@@ -14092,7 +14109,7 @@
                                 <a:solidFill>
                                   <a:schemeClr val="tx1"/>
                                 </a:solidFill>
-                                <a:latin typeface="Cambria Math" panose="02040503050406030204" pitchFamily="18" charset="0"/>
+                                <a:latin typeface="Cambria Math"/>
                                 <a:ea typeface="Cambria Math" panose="02040503050406030204" pitchFamily="18" charset="0"/>
                               </a:rPr>
                             </m:ctrlPr>
@@ -14142,7 +14159,7 @@
                       <m:sSupPr>
                         <m:ctrlPr>
                           <a:rPr lang="en-US" sz="2800" i="1" dirty="0">
-                            <a:latin typeface="Cambria Math" panose="02040503050406030204" pitchFamily="18" charset="0"/>
+                            <a:latin typeface="Cambria Math"/>
                             <a:ea typeface="Cambria Math" panose="02040503050406030204" pitchFamily="18" charset="0"/>
                           </a:rPr>
                         </m:ctrlPr>
@@ -14241,7 +14258,7 @@
                       <m:sSupPr>
                         <m:ctrlPr>
                           <a:rPr lang="en-US" sz="2800" i="1">
-                            <a:latin typeface="Cambria Math" panose="02040503050406030204" pitchFamily="18" charset="0"/>
+                            <a:latin typeface="Cambria Math"/>
                             <a:ea typeface="Cambria Math" panose="02040503050406030204" pitchFamily="18" charset="0"/>
                           </a:rPr>
                         </m:ctrlPr>
@@ -14277,7 +14294,7 @@
                         <m:chr m:val="̇"/>
                         <m:ctrlPr>
                           <a:rPr lang="en-US" sz="2800" i="1" dirty="0">
-                            <a:latin typeface="Cambria Math" panose="02040503050406030204" pitchFamily="18" charset="0"/>
+                            <a:latin typeface="Cambria Math"/>
                             <a:ea typeface="Cambria Math" panose="02040503050406030204" pitchFamily="18" charset="0"/>
                           </a:rPr>
                         </m:ctrlPr>
@@ -14306,7 +14323,7 @@
                       <m:sSupPr>
                         <m:ctrlPr>
                           <a:rPr lang="en-US" sz="2800" i="1">
-                            <a:latin typeface="Cambria Math" panose="02040503050406030204" pitchFamily="18" charset="0"/>
+                            <a:latin typeface="Cambria Math"/>
                             <a:ea typeface="Cambria Math" panose="02040503050406030204" pitchFamily="18" charset="0"/>
                           </a:rPr>
                         </m:ctrlPr>
@@ -14431,7 +14448,7 @@
                             <a:solidFill>
                               <a:schemeClr val="tx1"/>
                             </a:solidFill>
-                            <a:latin typeface="Cambria Math" panose="02040503050406030204" pitchFamily="18" charset="0"/>
+                            <a:latin typeface="Cambria Math"/>
                             <a:ea typeface="Cambria Math" panose="02040503050406030204" pitchFamily="18" charset="0"/>
                           </a:rPr>
                         </m:ctrlPr>
@@ -14557,7 +14574,7 @@
                             <a:solidFill>
                               <a:schemeClr val="tx1"/>
                             </a:solidFill>
-                            <a:latin typeface="Cambria Math" panose="02040503050406030204" pitchFamily="18" charset="0"/>
+                            <a:latin typeface="Cambria Math"/>
                             <a:ea typeface="Cambria Math" panose="02040503050406030204" pitchFamily="18" charset="0"/>
                           </a:rPr>
                         </m:ctrlPr>
@@ -15058,7 +15075,7 @@
           <p:cNvPr id="3" name="Oval 2">
             <a:extLst>
               <a:ext uri="{FF2B5EF4-FFF2-40B4-BE49-F238E27FC236}">
-                <a16:creationId xmlns:a16="http://schemas.microsoft.com/office/drawing/2014/main" id="{1777F673-0A0F-48CE-AFAC-BC0DA8BE8867}"/>
+                <a16:creationId xmlns:a16="http://schemas.microsoft.com/office/drawing/2014/main" xmlns="" id="{1777F673-0A0F-48CE-AFAC-BC0DA8BE8867}"/>
               </a:ext>
             </a:extLst>
           </p:cNvPr>
@@ -15105,7 +15122,7 @@
           <p:cNvPr id="20" name="Oval 19">
             <a:extLst>
               <a:ext uri="{FF2B5EF4-FFF2-40B4-BE49-F238E27FC236}">
-                <a16:creationId xmlns:a16="http://schemas.microsoft.com/office/drawing/2014/main" id="{30EDF84D-21D0-4E0E-9688-73570C2DBF39}"/>
+                <a16:creationId xmlns:a16="http://schemas.microsoft.com/office/drawing/2014/main" xmlns="" id="{30EDF84D-21D0-4E0E-9688-73570C2DBF39}"/>
               </a:ext>
             </a:extLst>
           </p:cNvPr>
@@ -15152,7 +15169,7 @@
           <p:cNvPr id="5" name="Connector: Curved 4">
             <a:extLst>
               <a:ext uri="{FF2B5EF4-FFF2-40B4-BE49-F238E27FC236}">
-                <a16:creationId xmlns:a16="http://schemas.microsoft.com/office/drawing/2014/main" id="{03EC99EF-F2B1-4AE2-9F24-B1CAF2A2FCCE}"/>
+                <a16:creationId xmlns:a16="http://schemas.microsoft.com/office/drawing/2014/main" xmlns="" id="{03EC99EF-F2B1-4AE2-9F24-B1CAF2A2FCCE}"/>
               </a:ext>
             </a:extLst>
           </p:cNvPr>
@@ -15223,7 +15240,7 @@
           <p:cNvPr id="6" name="Rectangle 2">
             <a:extLst>
               <a:ext uri="{FF2B5EF4-FFF2-40B4-BE49-F238E27FC236}">
-                <a16:creationId xmlns:a16="http://schemas.microsoft.com/office/drawing/2014/main" id="{BFE2B8B8-1B06-D1A3-0EBC-AD582F5F969B}"/>
+                <a16:creationId xmlns:a16="http://schemas.microsoft.com/office/drawing/2014/main" xmlns="" id="{BFE2B8B8-1B06-D1A3-0EBC-AD582F5F969B}"/>
               </a:ext>
             </a:extLst>
           </p:cNvPr>
@@ -15703,7 +15720,7 @@
           <p:cNvPr id="7" name="TextBox 6">
             <a:extLst>
               <a:ext uri="{FF2B5EF4-FFF2-40B4-BE49-F238E27FC236}">
-                <a16:creationId xmlns:a16="http://schemas.microsoft.com/office/drawing/2014/main" id="{FA3192D4-19F2-1541-D8C4-EBBEE83E6DC8}"/>
+                <a16:creationId xmlns:a16="http://schemas.microsoft.com/office/drawing/2014/main" xmlns="" id="{FA3192D4-19F2-1541-D8C4-EBBEE83E6DC8}"/>
               </a:ext>
             </a:extLst>
           </p:cNvPr>
@@ -15898,7 +15915,7 @@
           <p:cNvPr id="4" name="TextBox 3">
             <a:extLst>
               <a:ext uri="{FF2B5EF4-FFF2-40B4-BE49-F238E27FC236}">
-                <a16:creationId xmlns:a16="http://schemas.microsoft.com/office/drawing/2014/main" id="{E9C9D319-7F41-5AB4-8909-87E26C83C418}"/>
+                <a16:creationId xmlns:a16="http://schemas.microsoft.com/office/drawing/2014/main" xmlns="" id="{E9C9D319-7F41-5AB4-8909-87E26C83C418}"/>
               </a:ext>
             </a:extLst>
           </p:cNvPr>
@@ -15941,7 +15958,7 @@
           <p:cNvPr id="6" name="Rectangle 1">
             <a:extLst>
               <a:ext uri="{FF2B5EF4-FFF2-40B4-BE49-F238E27FC236}">
-                <a16:creationId xmlns:a16="http://schemas.microsoft.com/office/drawing/2014/main" id="{F55C6316-2388-F075-0902-5EC68D996AF8}"/>
+                <a16:creationId xmlns:a16="http://schemas.microsoft.com/office/drawing/2014/main" xmlns="" id="{F55C6316-2388-F075-0902-5EC68D996AF8}"/>
               </a:ext>
             </a:extLst>
           </p:cNvPr>
@@ -16978,7 +16995,7 @@
           <p:cNvPr id="5" name="مربع نص 1">
             <a:extLst>
               <a:ext uri="{FF2B5EF4-FFF2-40B4-BE49-F238E27FC236}">
-                <a16:creationId xmlns:a16="http://schemas.microsoft.com/office/drawing/2014/main" id="{7711DB52-DA0E-C95D-DFAF-CCC7BD2BE49D}"/>
+                <a16:creationId xmlns:a16="http://schemas.microsoft.com/office/drawing/2014/main" xmlns="" id="{7711DB52-DA0E-C95D-DFAF-CCC7BD2BE49D}"/>
               </a:ext>
             </a:extLst>
           </p:cNvPr>
@@ -17042,7 +17059,7 @@
           <p:cNvPr id="6" name="TextBox 5">
             <a:extLst>
               <a:ext uri="{FF2B5EF4-FFF2-40B4-BE49-F238E27FC236}">
-                <a16:creationId xmlns:a16="http://schemas.microsoft.com/office/drawing/2014/main" id="{34183D16-35EC-852C-6B9E-C6ED3DBFD9D3}"/>
+                <a16:creationId xmlns:a16="http://schemas.microsoft.com/office/drawing/2014/main" xmlns="" id="{34183D16-35EC-852C-6B9E-C6ED3DBFD9D3}"/>
               </a:ext>
             </a:extLst>
           </p:cNvPr>
@@ -17368,7 +17385,7 @@
           <p:cNvPr id="7" name="TextBox 6">
             <a:extLst>
               <a:ext uri="{FF2B5EF4-FFF2-40B4-BE49-F238E27FC236}">
-                <a16:creationId xmlns:a16="http://schemas.microsoft.com/office/drawing/2014/main" id="{B66F6C66-435D-19C9-753E-FB43FE2E13B8}"/>
+                <a16:creationId xmlns:a16="http://schemas.microsoft.com/office/drawing/2014/main" xmlns="" id="{B66F6C66-435D-19C9-753E-FB43FE2E13B8}"/>
               </a:ext>
             </a:extLst>
           </p:cNvPr>
@@ -17450,7 +17467,7 @@
           <p:cNvPr id="9" name="مربع نص 1">
             <a:extLst>
               <a:ext uri="{FF2B5EF4-FFF2-40B4-BE49-F238E27FC236}">
-                <a16:creationId xmlns:a16="http://schemas.microsoft.com/office/drawing/2014/main" id="{C21C7ED3-9CF9-F6A0-18E3-82DF544CCBB4}"/>
+                <a16:creationId xmlns:a16="http://schemas.microsoft.com/office/drawing/2014/main" xmlns="" id="{C21C7ED3-9CF9-F6A0-18E3-82DF544CCBB4}"/>
               </a:ext>
             </a:extLst>
           </p:cNvPr>
@@ -17585,7 +17602,7 @@
                             <a:solidFill>
                               <a:schemeClr val="tx1"/>
                             </a:solidFill>
-                            <a:latin typeface="Cambria Math" panose="02040503050406030204" pitchFamily="18" charset="0"/>
+                            <a:latin typeface="Cambria Math"/>
                             <a:ea typeface="Cambria Math" panose="02040503050406030204" pitchFamily="18" charset="0"/>
                           </a:rPr>
                         </m:ctrlPr>
@@ -17598,7 +17615,7 @@
                                 <a:solidFill>
                                   <a:schemeClr val="tx1"/>
                                 </a:solidFill>
-                                <a:latin typeface="Cambria Math" panose="02040503050406030204" pitchFamily="18" charset="0"/>
+                                <a:latin typeface="Cambria Math"/>
                                 <a:ea typeface="Cambria Math" panose="02040503050406030204" pitchFamily="18" charset="0"/>
                               </a:rPr>
                             </m:ctrlPr>
@@ -17611,7 +17628,7 @@
                                     <a:solidFill>
                                       <a:schemeClr val="tx1"/>
                                     </a:solidFill>
-                                    <a:latin typeface="Cambria Math" panose="02040503050406030204" pitchFamily="18" charset="0"/>
+                                    <a:latin typeface="Cambria Math"/>
                                     <a:ea typeface="Cambria Math" panose="02040503050406030204" pitchFamily="18" charset="0"/>
                                   </a:rPr>
                                 </m:ctrlPr>
@@ -17669,7 +17686,7 @@
                           <m:sSupPr>
                             <m:ctrlPr>
                               <a:rPr lang="en-US" sz="2800" i="1" dirty="0">
-                                <a:latin typeface="Cambria Math" panose="02040503050406030204" pitchFamily="18" charset="0"/>
+                                <a:latin typeface="Cambria Math"/>
                                 <a:ea typeface="Cambria Math" panose="02040503050406030204" pitchFamily="18" charset="0"/>
                               </a:rPr>
                             </m:ctrlPr>
@@ -17679,7 +17696,7 @@
                               <m:sSubPr>
                                 <m:ctrlPr>
                                   <a:rPr lang="en-US" sz="2800" i="1" dirty="0">
-                                    <a:latin typeface="Cambria Math" panose="02040503050406030204" pitchFamily="18" charset="0"/>
+                                    <a:latin typeface="Cambria Math"/>
                                     <a:ea typeface="Cambria Math" panose="02040503050406030204" pitchFamily="18" charset="0"/>
                                   </a:rPr>
                                 </m:ctrlPr>
@@ -17753,7 +17770,7 @@
                           <m:sSupPr>
                             <m:ctrlPr>
                               <a:rPr lang="en-US" sz="2800" i="1" dirty="0">
-                                <a:latin typeface="Cambria Math" panose="02040503050406030204" pitchFamily="18" charset="0"/>
+                                <a:latin typeface="Cambria Math"/>
                                 <a:ea typeface="Cambria Math" panose="02040503050406030204" pitchFamily="18" charset="0"/>
                               </a:rPr>
                             </m:ctrlPr>
@@ -17763,7 +17780,7 @@
                               <m:sSubPr>
                                 <m:ctrlPr>
                                   <a:rPr lang="en-US" sz="2800" i="1" dirty="0">
-                                    <a:latin typeface="Cambria Math" panose="02040503050406030204" pitchFamily="18" charset="0"/>
+                                    <a:latin typeface="Cambria Math"/>
                                     <a:ea typeface="Cambria Math" panose="02040503050406030204" pitchFamily="18" charset="0"/>
                                   </a:rPr>
                                 </m:ctrlPr>
@@ -17816,7 +17833,7 @@
                           <m:sSubPr>
                             <m:ctrlPr>
                               <a:rPr lang="en-US" sz="2800" i="1" dirty="0">
-                                <a:latin typeface="Cambria Math" panose="02040503050406030204" pitchFamily="18" charset="0"/>
+                                <a:latin typeface="Cambria Math"/>
                                 <a:ea typeface="Cambria Math" panose="02040503050406030204" pitchFamily="18" charset="0"/>
                               </a:rPr>
                             </m:ctrlPr>
@@ -17853,7 +17870,7 @@
                           <m:sSupPr>
                             <m:ctrlPr>
                               <a:rPr lang="en-US" sz="2800" i="1" dirty="0">
-                                <a:latin typeface="Cambria Math" panose="02040503050406030204" pitchFamily="18" charset="0"/>
+                                <a:latin typeface="Cambria Math"/>
                                 <a:ea typeface="Cambria Math" panose="02040503050406030204" pitchFamily="18" charset="0"/>
                               </a:rPr>
                             </m:ctrlPr>
@@ -17863,7 +17880,7 @@
                               <m:sSupPr>
                                 <m:ctrlPr>
                                   <a:rPr lang="en-US" sz="2800" i="1" dirty="0" smtClean="0">
-                                    <a:latin typeface="Cambria Math" panose="02040503050406030204" pitchFamily="18" charset="0"/>
+                                    <a:latin typeface="Cambria Math"/>
                                     <a:ea typeface="Cambria Math" panose="02040503050406030204" pitchFamily="18" charset="0"/>
                                   </a:rPr>
                                 </m:ctrlPr>
@@ -17891,7 +17908,7 @@
                               <m:sSubPr>
                                 <m:ctrlPr>
                                   <a:rPr lang="en-US" sz="2800" i="1" dirty="0">
-                                    <a:latin typeface="Cambria Math" panose="02040503050406030204" pitchFamily="18" charset="0"/>
+                                    <a:latin typeface="Cambria Math"/>
                                     <a:ea typeface="Cambria Math" panose="02040503050406030204" pitchFamily="18" charset="0"/>
                                   </a:rPr>
                                 </m:ctrlPr>
@@ -17958,7 +17975,7 @@
                           <m:sSupPr>
                             <m:ctrlPr>
                               <a:rPr lang="en-US" sz="2800" i="1" dirty="0">
-                                <a:latin typeface="Cambria Math" panose="02040503050406030204" pitchFamily="18" charset="0"/>
+                                <a:latin typeface="Cambria Math"/>
                                 <a:ea typeface="Cambria Math" panose="02040503050406030204" pitchFamily="18" charset="0"/>
                               </a:rPr>
                             </m:ctrlPr>
@@ -17968,7 +17985,7 @@
                               <m:sSubPr>
                                 <m:ctrlPr>
                                   <a:rPr lang="en-US" sz="2800" i="1" dirty="0">
-                                    <a:latin typeface="Cambria Math" panose="02040503050406030204" pitchFamily="18" charset="0"/>
+                                    <a:latin typeface="Cambria Math"/>
                                     <a:ea typeface="Cambria Math" panose="02040503050406030204" pitchFamily="18" charset="0"/>
                                   </a:rPr>
                                 </m:ctrlPr>
@@ -18028,7 +18045,7 @@
                           <m:sSubPr>
                             <m:ctrlPr>
                               <a:rPr lang="en-US" sz="2800" i="1" dirty="0">
-                                <a:latin typeface="Cambria Math" panose="02040503050406030204" pitchFamily="18" charset="0"/>
+                                <a:latin typeface="Cambria Math"/>
                                 <a:ea typeface="Cambria Math" panose="02040503050406030204" pitchFamily="18" charset="0"/>
                               </a:rPr>
                             </m:ctrlPr>
@@ -18079,7 +18096,7 @@
                       <m:fPr>
                         <m:ctrlPr>
                           <a:rPr lang="en-US" sz="2800" i="1" dirty="0" smtClean="0">
-                            <a:latin typeface="Cambria Math" panose="02040503050406030204" pitchFamily="18" charset="0"/>
+                            <a:latin typeface="Cambria Math"/>
                             <a:ea typeface="Cambria Math" panose="02040503050406030204" pitchFamily="18" charset="0"/>
                           </a:rPr>
                         </m:ctrlPr>
@@ -18089,7 +18106,7 @@
                           <m:sSupPr>
                             <m:ctrlPr>
                               <a:rPr lang="en-US" sz="2800" i="1" dirty="0">
-                                <a:latin typeface="Cambria Math" panose="02040503050406030204" pitchFamily="18" charset="0"/>
+                                <a:latin typeface="Cambria Math"/>
                                 <a:ea typeface="Cambria Math" panose="02040503050406030204" pitchFamily="18" charset="0"/>
                               </a:rPr>
                             </m:ctrlPr>
@@ -18099,7 +18116,7 @@
                               <m:sSubPr>
                                 <m:ctrlPr>
                                   <a:rPr lang="en-US" sz="2800" i="1" dirty="0">
-                                    <a:latin typeface="Cambria Math" panose="02040503050406030204" pitchFamily="18" charset="0"/>
+                                    <a:latin typeface="Cambria Math"/>
                                     <a:ea typeface="Cambria Math" panose="02040503050406030204" pitchFamily="18" charset="0"/>
                                   </a:rPr>
                                 </m:ctrlPr>
@@ -18145,7 +18162,7 @@
                           <m:sSupPr>
                             <m:ctrlPr>
                               <a:rPr lang="en-US" sz="2800" i="1" dirty="0">
-                                <a:latin typeface="Cambria Math" panose="02040503050406030204" pitchFamily="18" charset="0"/>
+                                <a:latin typeface="Cambria Math"/>
                                 <a:ea typeface="Cambria Math" panose="02040503050406030204" pitchFamily="18" charset="0"/>
                               </a:rPr>
                             </m:ctrlPr>
@@ -18155,7 +18172,7 @@
                               <m:sSubPr>
                                 <m:ctrlPr>
                                   <a:rPr lang="en-US" sz="2800" i="1" dirty="0">
-                                    <a:latin typeface="Cambria Math" panose="02040503050406030204" pitchFamily="18" charset="0"/>
+                                    <a:latin typeface="Cambria Math"/>
                                     <a:ea typeface="Cambria Math" panose="02040503050406030204" pitchFamily="18" charset="0"/>
                                   </a:rPr>
                                 </m:ctrlPr>
@@ -18229,7 +18246,7 @@
                           <m:sSupPr>
                             <m:ctrlPr>
                               <a:rPr lang="en-US" sz="2800" i="1" dirty="0">
-                                <a:latin typeface="Cambria Math" panose="02040503050406030204" pitchFamily="18" charset="0"/>
+                                <a:latin typeface="Cambria Math"/>
                                 <a:ea typeface="Cambria Math" panose="02040503050406030204" pitchFamily="18" charset="0"/>
                               </a:rPr>
                             </m:ctrlPr>
@@ -18239,7 +18256,7 @@
                               <m:sSubPr>
                                 <m:ctrlPr>
                                   <a:rPr lang="en-US" sz="2800" i="1" dirty="0">
-                                    <a:latin typeface="Cambria Math" panose="02040503050406030204" pitchFamily="18" charset="0"/>
+                                    <a:latin typeface="Cambria Math"/>
                                     <a:ea typeface="Cambria Math" panose="02040503050406030204" pitchFamily="18" charset="0"/>
                                   </a:rPr>
                                 </m:ctrlPr>
@@ -18292,7 +18309,7 @@
                           <m:sSubPr>
                             <m:ctrlPr>
                               <a:rPr lang="en-US" sz="2800" i="1" dirty="0">
-                                <a:latin typeface="Cambria Math" panose="02040503050406030204" pitchFamily="18" charset="0"/>
+                                <a:latin typeface="Cambria Math"/>
                                 <a:ea typeface="Cambria Math" panose="02040503050406030204" pitchFamily="18" charset="0"/>
                               </a:rPr>
                             </m:ctrlPr>
@@ -18329,7 +18346,7 @@
                           <m:dPr>
                             <m:ctrlPr>
                               <a:rPr lang="en-US" sz="2800" b="0" i="1" dirty="0" smtClean="0">
-                                <a:latin typeface="Cambria Math" panose="02040503050406030204" pitchFamily="18" charset="0"/>
+                                <a:latin typeface="Cambria Math"/>
                                 <a:ea typeface="Cambria Math" panose="02040503050406030204" pitchFamily="18" charset="0"/>
                               </a:rPr>
                             </m:ctrlPr>
@@ -18353,7 +18370,7 @@
                               <m:sSubPr>
                                 <m:ctrlPr>
                                   <a:rPr lang="en-US" sz="2800" b="0" i="1" dirty="0" smtClean="0">
-                                    <a:latin typeface="Cambria Math" panose="02040503050406030204" pitchFamily="18" charset="0"/>
+                                    <a:latin typeface="Cambria Math"/>
                                     <a:ea typeface="Cambria Math" panose="02040503050406030204" pitchFamily="18" charset="0"/>
                                   </a:rPr>
                                 </m:ctrlPr>
@@ -18383,7 +18400,7 @@
                           <m:dPr>
                             <m:ctrlPr>
                               <a:rPr lang="en-US" sz="2800" b="0" i="1" dirty="0" smtClean="0">
-                                <a:latin typeface="Cambria Math" panose="02040503050406030204" pitchFamily="18" charset="0"/>
+                                <a:latin typeface="Cambria Math"/>
                                 <a:ea typeface="Cambria Math" panose="02040503050406030204" pitchFamily="18" charset="0"/>
                               </a:rPr>
                             </m:ctrlPr>
@@ -18407,7 +18424,7 @@
                               <m:sSubPr>
                                 <m:ctrlPr>
                                   <a:rPr lang="en-US" sz="2800" b="0" i="1" dirty="0" smtClean="0">
-                                    <a:latin typeface="Cambria Math" panose="02040503050406030204" pitchFamily="18" charset="0"/>
+                                    <a:latin typeface="Cambria Math"/>
                                     <a:ea typeface="Cambria Math" panose="02040503050406030204" pitchFamily="18" charset="0"/>
                                   </a:rPr>
                                 </m:ctrlPr>
@@ -18458,7 +18475,7 @@
                           <m:sSubPr>
                             <m:ctrlPr>
                               <a:rPr lang="en-US" sz="2800" b="0" i="1" dirty="0" smtClean="0">
-                                <a:latin typeface="Cambria Math" panose="02040503050406030204" pitchFamily="18" charset="0"/>
+                                <a:latin typeface="Cambria Math"/>
                                 <a:ea typeface="Cambria Math" panose="02040503050406030204" pitchFamily="18" charset="0"/>
                               </a:rPr>
                             </m:ctrlPr>
@@ -18769,7 +18786,7 @@
                               <a:solidFill>
                                 <a:srgbClr val="7030A0"/>
                               </a:solidFill>
-                              <a:latin typeface="Cambria Math" panose="02040503050406030204" pitchFamily="18" charset="0"/>
+                              <a:latin typeface="Cambria Math"/>
                               <a:ea typeface="Cambria Math" panose="02040503050406030204" pitchFamily="18" charset="0"/>
                             </a:rPr>
                           </m:ctrlPr>
@@ -18824,7 +18841,7 @@
                                   <a:solidFill>
                                     <a:srgbClr val="7030A0"/>
                                   </a:solidFill>
-                                  <a:latin typeface="Cambria Math" panose="02040503050406030204" pitchFamily="18" charset="0"/>
+                                  <a:latin typeface="Cambria Math"/>
                                   <a:ea typeface="Cambria Math" panose="02040503050406030204" pitchFamily="18" charset="0"/>
                                 </a:rPr>
                               </m:ctrlPr>
@@ -18883,7 +18900,7 @@
                               <a:solidFill>
                                 <a:srgbClr val="7030A0"/>
                               </a:solidFill>
-                              <a:latin typeface="Cambria Math" panose="02040503050406030204" pitchFamily="18" charset="0"/>
+                              <a:latin typeface="Cambria Math"/>
                               <a:ea typeface="Cambria Math" panose="02040503050406030204" pitchFamily="18" charset="0"/>
                             </a:rPr>
                           </m:ctrlPr>
@@ -18938,7 +18955,7 @@
                                   <a:solidFill>
                                     <a:srgbClr val="7030A0"/>
                                   </a:solidFill>
-                                  <a:latin typeface="Cambria Math" panose="02040503050406030204" pitchFamily="18" charset="0"/>
+                                  <a:latin typeface="Cambria Math"/>
                                   <a:ea typeface="Cambria Math" panose="02040503050406030204" pitchFamily="18" charset="0"/>
                                 </a:rPr>
                               </m:ctrlPr>
@@ -18997,7 +19014,7 @@
                               <a:solidFill>
                                 <a:srgbClr val="7030A0"/>
                               </a:solidFill>
-                              <a:latin typeface="Cambria Math" panose="02040503050406030204" pitchFamily="18" charset="0"/>
+                              <a:latin typeface="Cambria Math"/>
                               <a:ea typeface="Cambria Math" panose="02040503050406030204" pitchFamily="18" charset="0"/>
                             </a:rPr>
                           </m:ctrlPr>
@@ -19052,7 +19069,7 @@
                                   <a:solidFill>
                                     <a:srgbClr val="7030A0"/>
                                   </a:solidFill>
-                                  <a:latin typeface="Cambria Math" panose="02040503050406030204" pitchFamily="18" charset="0"/>
+                                  <a:latin typeface="Cambria Math"/>
                                   <a:ea typeface="Cambria Math" panose="02040503050406030204" pitchFamily="18" charset="0"/>
                                 </a:rPr>
                               </m:ctrlPr>
@@ -19274,7 +19291,7 @@
           <p:cNvPr id="2" name="TextBox 1">
             <a:extLst>
               <a:ext uri="{FF2B5EF4-FFF2-40B4-BE49-F238E27FC236}">
-                <a16:creationId xmlns:a16="http://schemas.microsoft.com/office/drawing/2014/main" id="{A0B656E5-2E8A-2E76-0AA7-ACE1F1571519}"/>
+                <a16:creationId xmlns:a16="http://schemas.microsoft.com/office/drawing/2014/main" xmlns="" id="{A0B656E5-2E8A-2E76-0AA7-ACE1F1571519}"/>
               </a:ext>
             </a:extLst>
           </p:cNvPr>
@@ -19386,7 +19403,7 @@
                       <m:funcPr>
                         <m:ctrlPr>
                           <a:rPr lang="en-US" sz="2800" i="1">
-                            <a:latin typeface="Cambria Math" panose="02040503050406030204" pitchFamily="18" charset="0"/>
+                            <a:latin typeface="Cambria Math"/>
                           </a:rPr>
                         </m:ctrlPr>
                       </m:funcPr>
@@ -19409,7 +19426,7 @@
                           <m:limLowPr>
                             <m:ctrlPr>
                               <a:rPr lang="en-US" sz="2800" i="1">
-                                <a:latin typeface="Cambria Math" panose="02040503050406030204" pitchFamily="18" charset="0"/>
+                                <a:latin typeface="Cambria Math"/>
                               </a:rPr>
                             </m:ctrlPr>
                           </m:limLowPr>
@@ -19446,7 +19463,7 @@
                           <m:dPr>
                             <m:ctrlPr>
                               <a:rPr lang="en-US" sz="2800" i="1">
-                                <a:latin typeface="Cambria Math" panose="02040503050406030204" pitchFamily="18" charset="0"/>
+                                <a:latin typeface="Cambria Math"/>
                                 <a:ea typeface="Cambria Math" panose="02040503050406030204" pitchFamily="18" charset="0"/>
                               </a:rPr>
                             </m:ctrlPr>
@@ -19535,7 +19552,7 @@
                         <m:funcPr>
                           <m:ctrlPr>
                             <a:rPr lang="en-US" sz="2800" i="1">
-                              <a:latin typeface="Cambria Math" panose="02040503050406030204" pitchFamily="18" charset="0"/>
+                              <a:latin typeface="Cambria Math"/>
                             </a:rPr>
                           </m:ctrlPr>
                         </m:funcPr>
@@ -19557,7 +19574,7 @@
                             <m:limLowPr>
                               <m:ctrlPr>
                                 <a:rPr lang="en-US" sz="2800" i="1">
-                                  <a:latin typeface="Cambria Math" panose="02040503050406030204" pitchFamily="18" charset="0"/>
+                                  <a:latin typeface="Cambria Math"/>
                                 </a:rPr>
                               </m:ctrlPr>
                             </m:limLowPr>
@@ -19590,7 +19607,7 @@
                                 <m:sSubPr>
                                   <m:ctrlPr>
                                     <a:rPr lang="en-US" sz="2800" i="1">
-                                      <a:latin typeface="Cambria Math" panose="02040503050406030204" pitchFamily="18" charset="0"/>
+                                      <a:latin typeface="Cambria Math"/>
                                       <a:ea typeface="Cambria Math" panose="02040503050406030204" pitchFamily="18" charset="0"/>
                                     </a:rPr>
                                   </m:ctrlPr>
@@ -19622,7 +19639,7 @@
                             <m:dPr>
                               <m:ctrlPr>
                                 <a:rPr lang="en-US" sz="2800" i="1">
-                                  <a:latin typeface="Cambria Math" panose="02040503050406030204" pitchFamily="18" charset="0"/>
+                                  <a:latin typeface="Cambria Math"/>
                                   <a:ea typeface="Cambria Math" panose="02040503050406030204" pitchFamily="18" charset="0"/>
                                 </a:rPr>
                               </m:ctrlPr>
@@ -19653,7 +19670,7 @@
                                 <m:sSubPr>
                                   <m:ctrlPr>
                                     <a:rPr lang="en-US" sz="2800" i="1">
-                                      <a:latin typeface="Cambria Math" panose="02040503050406030204" pitchFamily="18" charset="0"/>
+                                      <a:latin typeface="Cambria Math"/>
                                       <a:ea typeface="Cambria Math" panose="02040503050406030204" pitchFamily="18" charset="0"/>
                                     </a:rPr>
                                   </m:ctrlPr>
@@ -19745,7 +19762,7 @@
                         <m:funcPr>
                           <m:ctrlPr>
                             <a:rPr lang="en-US" sz="2800" i="1">
-                              <a:latin typeface="Cambria Math" panose="02040503050406030204" pitchFamily="18" charset="0"/>
+                              <a:latin typeface="Cambria Math"/>
                             </a:rPr>
                           </m:ctrlPr>
                         </m:funcPr>
@@ -19767,7 +19784,7 @@
                             <m:limLowPr>
                               <m:ctrlPr>
                                 <a:rPr lang="en-US" sz="2800" i="1">
-                                  <a:latin typeface="Cambria Math" panose="02040503050406030204" pitchFamily="18" charset="0"/>
+                                  <a:latin typeface="Cambria Math"/>
                                 </a:rPr>
                               </m:ctrlPr>
                             </m:limLowPr>
@@ -19800,7 +19817,7 @@
                                 <m:sSubPr>
                                   <m:ctrlPr>
                                     <a:rPr lang="en-US" sz="2800" i="1">
-                                      <a:latin typeface="Cambria Math" panose="02040503050406030204" pitchFamily="18" charset="0"/>
+                                      <a:latin typeface="Cambria Math"/>
                                       <a:ea typeface="Cambria Math" panose="02040503050406030204" pitchFamily="18" charset="0"/>
                                     </a:rPr>
                                   </m:ctrlPr>
@@ -19832,7 +19849,7 @@
                             <m:dPr>
                               <m:ctrlPr>
                                 <a:rPr lang="en-US" sz="2800" i="1">
-                                  <a:latin typeface="Cambria Math" panose="02040503050406030204" pitchFamily="18" charset="0"/>
+                                  <a:latin typeface="Cambria Math"/>
                                   <a:ea typeface="Cambria Math" panose="02040503050406030204" pitchFamily="18" charset="0"/>
                                 </a:rPr>
                               </m:ctrlPr>
@@ -19863,7 +19880,7 @@
                                 <m:sSubPr>
                                   <m:ctrlPr>
                                     <a:rPr lang="en-US" sz="2800" i="1">
-                                      <a:latin typeface="Cambria Math" panose="02040503050406030204" pitchFamily="18" charset="0"/>
+                                      <a:latin typeface="Cambria Math"/>
                                       <a:ea typeface="Cambria Math" panose="02040503050406030204" pitchFamily="18" charset="0"/>
                                     </a:rPr>
                                   </m:ctrlPr>
@@ -19985,7 +20002,7 @@
                         <m:funcPr>
                           <m:ctrlPr>
                             <a:rPr lang="en-US" sz="2800" i="1">
-                              <a:latin typeface="Cambria Math" panose="02040503050406030204" pitchFamily="18" charset="0"/>
+                              <a:latin typeface="Cambria Math"/>
                             </a:rPr>
                           </m:ctrlPr>
                         </m:funcPr>
@@ -20007,7 +20024,7 @@
                             <m:limLowPr>
                               <m:ctrlPr>
                                 <a:rPr lang="en-US" sz="2800" i="1">
-                                  <a:latin typeface="Cambria Math" panose="02040503050406030204" pitchFamily="18" charset="0"/>
+                                  <a:latin typeface="Cambria Math"/>
                                 </a:rPr>
                               </m:ctrlPr>
                             </m:limLowPr>
@@ -20040,7 +20057,7 @@
                                 <m:sSubPr>
                                   <m:ctrlPr>
                                     <a:rPr lang="en-US" sz="2800" i="1">
-                                      <a:latin typeface="Cambria Math" panose="02040503050406030204" pitchFamily="18" charset="0"/>
+                                      <a:latin typeface="Cambria Math"/>
                                       <a:ea typeface="Cambria Math" panose="02040503050406030204" pitchFamily="18" charset="0"/>
                                     </a:rPr>
                                   </m:ctrlPr>
@@ -20072,7 +20089,7 @@
                             <m:dPr>
                               <m:ctrlPr>
                                 <a:rPr lang="en-US" sz="2800" i="1">
-                                  <a:latin typeface="Cambria Math" panose="02040503050406030204" pitchFamily="18" charset="0"/>
+                                  <a:latin typeface="Cambria Math"/>
                                   <a:ea typeface="Cambria Math" panose="02040503050406030204" pitchFamily="18" charset="0"/>
                                 </a:rPr>
                               </m:ctrlPr>
@@ -20103,7 +20120,7 @@
                                 <m:sSubPr>
                                   <m:ctrlPr>
                                     <a:rPr lang="en-US" sz="2800" i="1">
-                                      <a:latin typeface="Cambria Math" panose="02040503050406030204" pitchFamily="18" charset="0"/>
+                                      <a:latin typeface="Cambria Math"/>
                                       <a:ea typeface="Cambria Math" panose="02040503050406030204" pitchFamily="18" charset="0"/>
                                     </a:rPr>
                                   </m:ctrlPr>
@@ -20230,7 +20247,7 @@
           <p:cNvPr id="2" name="TextBox 1">
             <a:extLst>
               <a:ext uri="{FF2B5EF4-FFF2-40B4-BE49-F238E27FC236}">
-                <a16:creationId xmlns:a16="http://schemas.microsoft.com/office/drawing/2014/main" id="{E3C3C371-DF4A-1C4C-18DA-DE257E6F2DA1}"/>
+                <a16:creationId xmlns:a16="http://schemas.microsoft.com/office/drawing/2014/main" xmlns="" id="{E3C3C371-DF4A-1C4C-18DA-DE257E6F2DA1}"/>
               </a:ext>
             </a:extLst>
           </p:cNvPr>
@@ -20334,7 +20351,7 @@
                       <m:fPr>
                         <m:ctrlPr>
                           <a:rPr lang="en-US" sz="3200" i="1" dirty="0">
-                            <a:latin typeface="Cambria Math" panose="02040503050406030204" pitchFamily="18" charset="0"/>
+                            <a:latin typeface="Cambria Math"/>
                             <a:ea typeface="Cambria Math" panose="02040503050406030204" pitchFamily="18" charset="0"/>
                           </a:rPr>
                         </m:ctrlPr>
@@ -20374,7 +20391,7 @@
                           <m:sSupPr>
                             <m:ctrlPr>
                               <a:rPr lang="en-US" sz="3200" i="1" dirty="0" smtClean="0">
-                                <a:latin typeface="Cambria Math" panose="02040503050406030204" pitchFamily="18" charset="0"/>
+                                <a:latin typeface="Cambria Math"/>
                                 <a:ea typeface="Cambria Math" panose="02040503050406030204" pitchFamily="18" charset="0"/>
                               </a:rPr>
                             </m:ctrlPr>
@@ -20384,7 +20401,7 @@
                               <m:dPr>
                                 <m:ctrlPr>
                                   <a:rPr lang="en-US" sz="3200" b="0" i="1" dirty="0" smtClean="0">
-                                    <a:latin typeface="Cambria Math" panose="02040503050406030204" pitchFamily="18" charset="0"/>
+                                    <a:latin typeface="Cambria Math"/>
                                     <a:ea typeface="Cambria Math" panose="02040503050406030204" pitchFamily="18" charset="0"/>
                                   </a:rPr>
                                 </m:ctrlPr>
@@ -20602,7 +20619,7 @@
                             <a:solidFill>
                               <a:srgbClr val="7030A0"/>
                             </a:solidFill>
-                            <a:latin typeface="Cambria Math" panose="02040503050406030204" pitchFamily="18" charset="0"/>
+                            <a:latin typeface="Cambria Math"/>
                             <a:ea typeface="Cambria Math" panose="02040503050406030204" pitchFamily="18" charset="0"/>
                           </a:rPr>
                         </m:ctrlPr>
@@ -20689,7 +20706,7 @@
                             <a:solidFill>
                               <a:srgbClr val="7030A0"/>
                             </a:solidFill>
-                            <a:latin typeface="Cambria Math" panose="02040503050406030204" pitchFamily="18" charset="0"/>
+                            <a:latin typeface="Cambria Math"/>
                             <a:ea typeface="Cambria Math" panose="02040503050406030204" pitchFamily="18" charset="0"/>
                           </a:rPr>
                         </m:ctrlPr>
@@ -20714,7 +20731,7 @@
                                 <a:solidFill>
                                   <a:srgbClr val="7030A0"/>
                                 </a:solidFill>
-                                <a:latin typeface="Cambria Math" panose="02040503050406030204" pitchFamily="18" charset="0"/>
+                                <a:latin typeface="Cambria Math"/>
                                 <a:ea typeface="Cambria Math" panose="02040503050406030204" pitchFamily="18" charset="0"/>
                               </a:rPr>
                             </m:ctrlPr>
@@ -20803,7 +20820,7 @@
                             <a:solidFill>
                               <a:srgbClr val="7030A0"/>
                             </a:solidFill>
-                            <a:latin typeface="Cambria Math" panose="02040503050406030204" pitchFamily="18" charset="0"/>
+                            <a:latin typeface="Cambria Math"/>
                             <a:ea typeface="Cambria Math" panose="02040503050406030204" pitchFamily="18" charset="0"/>
                           </a:rPr>
                         </m:ctrlPr>
@@ -20828,7 +20845,7 @@
                                 <a:solidFill>
                                   <a:srgbClr val="7030A0"/>
                                 </a:solidFill>
-                                <a:latin typeface="Cambria Math" panose="02040503050406030204" pitchFamily="18" charset="0"/>
+                                <a:latin typeface="Cambria Math"/>
                                 <a:ea typeface="Cambria Math" panose="02040503050406030204" pitchFamily="18" charset="0"/>
                               </a:rPr>
                             </m:ctrlPr>
@@ -20841,7 +20858,7 @@
                                     <a:solidFill>
                                       <a:srgbClr val="7030A0"/>
                                     </a:solidFill>
-                                    <a:latin typeface="Cambria Math" panose="02040503050406030204" pitchFamily="18" charset="0"/>
+                                    <a:latin typeface="Cambria Math"/>
                                     <a:ea typeface="Cambria Math" panose="02040503050406030204" pitchFamily="18" charset="0"/>
                                   </a:rPr>
                                 </m:ctrlPr>
@@ -20916,7 +20933,7 @@
                             <a:solidFill>
                               <a:srgbClr val="7030A0"/>
                             </a:solidFill>
-                            <a:latin typeface="Cambria Math" panose="02040503050406030204" pitchFamily="18" charset="0"/>
+                            <a:latin typeface="Cambria Math"/>
                             <a:ea typeface="Cambria Math" panose="02040503050406030204" pitchFamily="18" charset="0"/>
                           </a:rPr>
                         </m:ctrlPr>
@@ -20929,7 +20946,7 @@
                                 <a:solidFill>
                                   <a:srgbClr val="7030A0"/>
                                 </a:solidFill>
-                                <a:latin typeface="Cambria Math" panose="02040503050406030204" pitchFamily="18" charset="0"/>
+                                <a:latin typeface="Cambria Math"/>
                                 <a:ea typeface="Cambria Math" panose="02040503050406030204" pitchFamily="18" charset="0"/>
                               </a:rPr>
                             </m:ctrlPr>
@@ -21118,7 +21135,7 @@
                       <m:sSupPr>
                         <m:ctrlPr>
                           <a:rPr lang="en-US" sz="2000" i="1" dirty="0">
-                            <a:latin typeface="Cambria Math" panose="02040503050406030204" pitchFamily="18" charset="0"/>
+                            <a:latin typeface="Cambria Math"/>
                             <a:ea typeface="Cambria Math" panose="02040503050406030204" pitchFamily="18" charset="0"/>
                           </a:rPr>
                         </m:ctrlPr>
@@ -21128,7 +21145,7 @@
                           <m:dPr>
                             <m:ctrlPr>
                               <a:rPr lang="en-US" sz="2000" i="1" dirty="0">
-                                <a:latin typeface="Cambria Math" panose="02040503050406030204" pitchFamily="18" charset="0"/>
+                                <a:latin typeface="Cambria Math"/>
                                 <a:ea typeface="Cambria Math" panose="02040503050406030204" pitchFamily="18" charset="0"/>
                               </a:rPr>
                             </m:ctrlPr>
@@ -21261,7 +21278,7 @@
                             <a:solidFill>
                               <a:srgbClr val="C00000"/>
                             </a:solidFill>
-                            <a:latin typeface="Cambria Math" panose="02040503050406030204" pitchFamily="18" charset="0"/>
+                            <a:latin typeface="Cambria Math"/>
                             <a:ea typeface="Cambria Math" panose="02040503050406030204" pitchFamily="18" charset="0"/>
                           </a:rPr>
                         </m:ctrlPr>
@@ -21441,7 +21458,7 @@
               <p:cNvPr id="2" name="Rectangle 1">
                 <a:extLst>
                   <a:ext uri="{FF2B5EF4-FFF2-40B4-BE49-F238E27FC236}">
-                    <a16:creationId xmlns:a16="http://schemas.microsoft.com/office/drawing/2014/main" id="{E38259AB-FC96-4E4F-813B-CBF48B051D11}"/>
+                    <a16:creationId xmlns:a16="http://schemas.microsoft.com/office/drawing/2014/main" xmlns="" id="{E38259AB-FC96-4E4F-813B-CBF48B051D11}"/>
                   </a:ext>
                 </a:extLst>
               </p:cNvPr>
@@ -21511,7 +21528,7 @@
                         <m:sSupPr>
                           <m:ctrlPr>
                             <a:rPr lang="en-US" sz="2000" i="1">
-                              <a:latin typeface="Cambria Math" panose="02040503050406030204" pitchFamily="18" charset="0"/>
+                              <a:latin typeface="Cambria Math"/>
                             </a:rPr>
                           </m:ctrlPr>
                         </m:sSupPr>
@@ -21520,7 +21537,7 @@
                             <m:dPr>
                               <m:ctrlPr>
                                 <a:rPr lang="en-US" sz="2000" i="1">
-                                  <a:latin typeface="Cambria Math" panose="02040503050406030204" pitchFamily="18" charset="0"/>
+                                  <a:latin typeface="Cambria Math"/>
                                 </a:rPr>
                               </m:ctrlPr>
                             </m:dPr>
@@ -21585,7 +21602,7 @@
                           <m:endChr m:val=""/>
                           <m:ctrlPr>
                             <a:rPr lang="en-US" sz="2000" i="1">
-                              <a:latin typeface="Cambria Math" panose="02040503050406030204" pitchFamily="18" charset="0"/>
+                              <a:latin typeface="Cambria Math"/>
                             </a:rPr>
                           </m:ctrlPr>
                         </m:dPr>
@@ -21670,7 +21687,7 @@
           <p:cNvPr id="3" name="TextBox 2">
             <a:extLst>
               <a:ext uri="{FF2B5EF4-FFF2-40B4-BE49-F238E27FC236}">
-                <a16:creationId xmlns:a16="http://schemas.microsoft.com/office/drawing/2014/main" id="{6E38D1A8-E91A-103A-D8C9-8F3D69E503BF}"/>
+                <a16:creationId xmlns:a16="http://schemas.microsoft.com/office/drawing/2014/main" xmlns="" id="{6E38D1A8-E91A-103A-D8C9-8F3D69E503BF}"/>
               </a:ext>
             </a:extLst>
           </p:cNvPr>
@@ -21851,7 +21868,7 @@
                             <a:solidFill>
                               <a:schemeClr val="tx1"/>
                             </a:solidFill>
-                            <a:latin typeface="Cambria Math" panose="02040503050406030204" pitchFamily="18" charset="0"/>
+                            <a:latin typeface="Cambria Math"/>
                             <a:ea typeface="Cambria Math" panose="02040503050406030204" pitchFamily="18" charset="0"/>
                           </a:rPr>
                         </m:ctrlPr>
@@ -21864,7 +21881,7 @@
                                 <a:solidFill>
                                   <a:schemeClr val="tx1"/>
                                 </a:solidFill>
-                                <a:latin typeface="Cambria Math" panose="02040503050406030204" pitchFamily="18" charset="0"/>
+                                <a:latin typeface="Cambria Math"/>
                                 <a:ea typeface="Cambria Math" panose="02040503050406030204" pitchFamily="18" charset="0"/>
                               </a:rPr>
                             </m:ctrlPr>
@@ -22013,7 +22030,7 @@
                                 <a:solidFill>
                                   <a:schemeClr val="tx1"/>
                                 </a:solidFill>
-                                <a:latin typeface="Cambria Math" panose="02040503050406030204" pitchFamily="18" charset="0"/>
+                                <a:latin typeface="Cambria Math"/>
                                 <a:ea typeface="Cambria Math" panose="02040503050406030204" pitchFamily="18" charset="0"/>
                               </a:rPr>
                             </m:ctrlPr>
@@ -22189,7 +22206,7 @@
                             <a:solidFill>
                               <a:schemeClr val="tx1"/>
                             </a:solidFill>
-                            <a:latin typeface="Cambria Math" panose="02040503050406030204" pitchFamily="18" charset="0"/>
+                            <a:latin typeface="Cambria Math"/>
                             <a:ea typeface="Cambria Math" panose="02040503050406030204" pitchFamily="18" charset="0"/>
                           </a:rPr>
                         </m:ctrlPr>
@@ -22276,7 +22293,7 @@
                             <a:solidFill>
                               <a:schemeClr val="tx1"/>
                             </a:solidFill>
-                            <a:latin typeface="Cambria Math" panose="02040503050406030204" pitchFamily="18" charset="0"/>
+                            <a:latin typeface="Cambria Math"/>
                             <a:ea typeface="Cambria Math" panose="02040503050406030204" pitchFamily="18" charset="0"/>
                           </a:rPr>
                         </m:ctrlPr>
@@ -22363,7 +22380,7 @@
                             <a:solidFill>
                               <a:schemeClr val="tx1"/>
                             </a:solidFill>
-                            <a:latin typeface="Cambria Math" panose="02040503050406030204" pitchFamily="18" charset="0"/>
+                            <a:latin typeface="Cambria Math"/>
                             <a:ea typeface="Cambria Math" panose="02040503050406030204" pitchFamily="18" charset="0"/>
                           </a:rPr>
                         </m:ctrlPr>
@@ -22388,7 +22405,7 @@
                                 <a:solidFill>
                                   <a:schemeClr val="tx1"/>
                                 </a:solidFill>
-                                <a:latin typeface="Cambria Math" panose="02040503050406030204" pitchFamily="18" charset="0"/>
+                                <a:latin typeface="Cambria Math"/>
                                 <a:ea typeface="Cambria Math" panose="02040503050406030204" pitchFamily="18" charset="0"/>
                               </a:rPr>
                             </m:ctrlPr>
@@ -22741,7 +22758,7 @@
                               <a:solidFill>
                                 <a:srgbClr val="7030A0"/>
                               </a:solidFill>
-                              <a:latin typeface="Cambria Math" panose="02040503050406030204" pitchFamily="18" charset="0"/>
+                              <a:latin typeface="Cambria Math"/>
                             </a:rPr>
                           </m:ctrlPr>
                         </m:dPr>
@@ -22773,7 +22790,7 @@
                               <a:solidFill>
                                 <a:srgbClr val="7030A0"/>
                               </a:solidFill>
-                              <a:latin typeface="Cambria Math" panose="02040503050406030204" pitchFamily="18" charset="0"/>
+                              <a:latin typeface="Cambria Math"/>
                             </a:rPr>
                           </m:ctrlPr>
                         </m:sSupPr>
@@ -22834,7 +22851,7 @@
                               <a:solidFill>
                                 <a:srgbClr val="7030A0"/>
                               </a:solidFill>
-                              <a:latin typeface="Cambria Math" panose="02040503050406030204" pitchFamily="18" charset="0"/>
+                              <a:latin typeface="Cambria Math"/>
                             </a:rPr>
                           </m:ctrlPr>
                         </m:dPr>
@@ -22875,7 +22892,7 @@
                               <a:solidFill>
                                 <a:srgbClr val="7030A0"/>
                               </a:solidFill>
-                              <a:latin typeface="Cambria Math" panose="02040503050406030204" pitchFamily="18" charset="0"/>
+                              <a:latin typeface="Cambria Math"/>
                             </a:rPr>
                           </m:ctrlPr>
                         </m:sSupPr>
@@ -22927,7 +22944,7 @@
                               <a:solidFill>
                                 <a:srgbClr val="7030A0"/>
                               </a:solidFill>
-                              <a:latin typeface="Cambria Math" panose="02040503050406030204" pitchFamily="18" charset="0"/>
+                              <a:latin typeface="Cambria Math"/>
                             </a:rPr>
                           </m:ctrlPr>
                         </m:dPr>
@@ -22968,7 +22985,7 @@
                               <a:solidFill>
                                 <a:srgbClr val="7030A0"/>
                               </a:solidFill>
-                              <a:latin typeface="Cambria Math" panose="02040503050406030204" pitchFamily="18" charset="0"/>
+                              <a:latin typeface="Cambria Math"/>
                             </a:rPr>
                           </m:ctrlPr>
                         </m:sSupPr>
@@ -23020,7 +23037,7 @@
                               <a:solidFill>
                                 <a:srgbClr val="7030A0"/>
                               </a:solidFill>
-                              <a:latin typeface="Cambria Math" panose="02040503050406030204" pitchFamily="18" charset="0"/>
+                              <a:latin typeface="Cambria Math"/>
                             </a:rPr>
                           </m:ctrlPr>
                         </m:dPr>
@@ -23129,7 +23146,7 @@
                             <a:solidFill>
                               <a:srgbClr val="C00000"/>
                             </a:solidFill>
-                            <a:latin typeface="Cambria Math" panose="02040503050406030204" pitchFamily="18" charset="0"/>
+                            <a:latin typeface="Cambria Math"/>
                           </a:rPr>
                         </m:ctrlPr>
                       </m:fPr>
@@ -23170,7 +23187,7 @@
                                 <a:solidFill>
                                   <a:srgbClr val="C00000"/>
                                 </a:solidFill>
-                                <a:latin typeface="Cambria Math" panose="02040503050406030204" pitchFamily="18" charset="0"/>
+                                <a:latin typeface="Cambria Math"/>
                               </a:rPr>
                             </m:ctrlPr>
                           </m:sSupPr>
@@ -23213,7 +23230,7 @@
                                 <a:solidFill>
                                   <a:srgbClr val="C00000"/>
                                 </a:solidFill>
-                                <a:latin typeface="Cambria Math" panose="02040503050406030204" pitchFamily="18" charset="0"/>
+                                <a:latin typeface="Cambria Math"/>
                               </a:rPr>
                             </m:ctrlPr>
                           </m:sSupPr>
@@ -23325,7 +23342,7 @@
                       <m:fPr>
                         <m:ctrlPr>
                           <a:rPr lang="en-US" sz="3200" i="1">
-                            <a:latin typeface="Cambria Math" panose="02040503050406030204" pitchFamily="18" charset="0"/>
+                            <a:latin typeface="Cambria Math"/>
                           </a:rPr>
                         </m:ctrlPr>
                       </m:fPr>
@@ -23354,7 +23371,7 @@
                           <m:sSupPr>
                             <m:ctrlPr>
                               <a:rPr lang="en-US" sz="3200" i="1">
-                                <a:latin typeface="Cambria Math" panose="02040503050406030204" pitchFamily="18" charset="0"/>
+                                <a:latin typeface="Cambria Math"/>
                               </a:rPr>
                             </m:ctrlPr>
                           </m:sSupPr>
@@ -23385,7 +23402,7 @@
                           <m:sSupPr>
                             <m:ctrlPr>
                               <a:rPr lang="en-US" sz="3200" i="1">
-                                <a:latin typeface="Cambria Math" panose="02040503050406030204" pitchFamily="18" charset="0"/>
+                                <a:latin typeface="Cambria Math"/>
                               </a:rPr>
                             </m:ctrlPr>
                           </m:sSupPr>
@@ -23425,7 +23442,7 @@
                             <a:solidFill>
                               <a:srgbClr val="FF0000"/>
                             </a:solidFill>
-                            <a:latin typeface="Cambria Math" panose="02040503050406030204" pitchFamily="18" charset="0"/>
+                            <a:latin typeface="Cambria Math"/>
                           </a:rPr>
                         </m:ctrlPr>
                       </m:fPr>
@@ -23468,7 +23485,7 @@
                                 <a:solidFill>
                                   <a:srgbClr val="FF0000"/>
                                 </a:solidFill>
-                                <a:latin typeface="Cambria Math" panose="02040503050406030204" pitchFamily="18" charset="0"/>
+                                <a:latin typeface="Cambria Math"/>
                               </a:rPr>
                             </m:ctrlPr>
                           </m:sSupPr>
@@ -23511,7 +23528,7 @@
                                 <a:solidFill>
                                   <a:srgbClr val="FF0000"/>
                                 </a:solidFill>
-                                <a:latin typeface="Cambria Math" panose="02040503050406030204" pitchFamily="18" charset="0"/>
+                                <a:latin typeface="Cambria Math"/>
                               </a:rPr>
                             </m:ctrlPr>
                           </m:sSupPr>
@@ -23553,7 +23570,7 @@
                             <a:solidFill>
                               <a:srgbClr val="006600"/>
                             </a:solidFill>
-                            <a:latin typeface="Cambria Math" panose="02040503050406030204" pitchFamily="18" charset="0"/>
+                            <a:latin typeface="Cambria Math"/>
                           </a:rPr>
                         </m:ctrlPr>
                       </m:fPr>
@@ -23615,7 +23632,7 @@
                                 <a:solidFill>
                                   <a:srgbClr val="006600"/>
                                 </a:solidFill>
-                                <a:latin typeface="Cambria Math" panose="02040503050406030204" pitchFamily="18" charset="0"/>
+                                <a:latin typeface="Cambria Math"/>
                               </a:rPr>
                             </m:ctrlPr>
                           </m:sSupPr>
@@ -23658,7 +23675,7 @@
                                 <a:solidFill>
                                   <a:srgbClr val="006600"/>
                                 </a:solidFill>
-                                <a:latin typeface="Cambria Math" panose="02040503050406030204" pitchFamily="18" charset="0"/>
+                                <a:latin typeface="Cambria Math"/>
                               </a:rPr>
                             </m:ctrlPr>
                           </m:sSupPr>
@@ -23815,7 +23832,7 @@
                             <a:solidFill>
                               <a:srgbClr val="7030A0"/>
                             </a:solidFill>
-                            <a:latin typeface="Cambria Math" panose="02040503050406030204" pitchFamily="18" charset="0"/>
+                            <a:latin typeface="Cambria Math"/>
                             <a:ea typeface="Cambria Math" panose="02040503050406030204" pitchFamily="18" charset="0"/>
                           </a:rPr>
                         </m:ctrlPr>
@@ -23858,7 +23875,7 @@
                             <a:solidFill>
                               <a:srgbClr val="7030A0"/>
                             </a:solidFill>
-                            <a:latin typeface="Cambria Math" panose="02040503050406030204" pitchFamily="18" charset="0"/>
+                            <a:latin typeface="Cambria Math"/>
                             <a:ea typeface="Cambria Math" panose="02040503050406030204" pitchFamily="18" charset="0"/>
                           </a:rPr>
                         </m:ctrlPr>
@@ -23886,7 +23903,7 @@
                                 <a:solidFill>
                                   <a:srgbClr val="7030A0"/>
                                 </a:solidFill>
-                                <a:latin typeface="Cambria Math" panose="02040503050406030204" pitchFamily="18" charset="0"/>
+                                <a:latin typeface="Cambria Math"/>
                                 <a:ea typeface="Cambria Math" panose="02040503050406030204" pitchFamily="18" charset="0"/>
                               </a:rPr>
                             </m:ctrlPr>
@@ -24337,7 +24354,7 @@
                             <a:solidFill>
                               <a:srgbClr val="C00000"/>
                             </a:solidFill>
-                            <a:latin typeface="Cambria Math" panose="02040503050406030204" pitchFamily="18" charset="0"/>
+                            <a:latin typeface="Cambria Math"/>
                           </a:rPr>
                         </m:ctrlPr>
                       </m:fPr>
@@ -24349,7 +24366,7 @@
                                 <a:solidFill>
                                   <a:srgbClr val="C00000"/>
                                 </a:solidFill>
-                                <a:latin typeface="Cambria Math" panose="02040503050406030204" pitchFamily="18" charset="0"/>
+                                <a:latin typeface="Cambria Math"/>
                               </a:rPr>
                             </m:ctrlPr>
                           </m:sSupPr>
@@ -24448,7 +24465,7 @@
                                 <a:solidFill>
                                   <a:srgbClr val="C00000"/>
                                 </a:solidFill>
-                                <a:latin typeface="Cambria Math" panose="02040503050406030204" pitchFamily="18" charset="0"/>
+                                <a:latin typeface="Cambria Math"/>
                               </a:rPr>
                             </m:ctrlPr>
                           </m:sSupPr>
@@ -24570,7 +24587,7 @@
                       <m:fPr>
                         <m:ctrlPr>
                           <a:rPr lang="en-US" sz="2800" i="1" dirty="0">
-                            <a:latin typeface="Cambria Math" panose="02040503050406030204" pitchFamily="18" charset="0"/>
+                            <a:latin typeface="Cambria Math"/>
                             <a:ea typeface="Cambria Math" panose="02040503050406030204" pitchFamily="18" charset="0"/>
                           </a:rPr>
                         </m:ctrlPr>
@@ -24580,7 +24597,7 @@
                           <m:sSupPr>
                             <m:ctrlPr>
                               <a:rPr lang="en-US" sz="2800" i="1" dirty="0">
-                                <a:latin typeface="Cambria Math" panose="02040503050406030204" pitchFamily="18" charset="0"/>
+                                <a:latin typeface="Cambria Math"/>
                                 <a:ea typeface="Cambria Math" panose="02040503050406030204" pitchFamily="18" charset="0"/>
                               </a:rPr>
                             </m:ctrlPr>
@@ -24659,7 +24676,7 @@
                           <m:sSupPr>
                             <m:ctrlPr>
                               <a:rPr lang="en-US" sz="2800" i="1" dirty="0">
-                                <a:latin typeface="Cambria Math" panose="02040503050406030204" pitchFamily="18" charset="0"/>
+                                <a:latin typeface="Cambria Math"/>
                                 <a:ea typeface="Cambria Math" panose="02040503050406030204" pitchFamily="18" charset="0"/>
                               </a:rPr>
                             </m:ctrlPr>
@@ -24707,7 +24724,7 @@
                       <m:fPr>
                         <m:ctrlPr>
                           <a:rPr lang="en-US" sz="2800" i="1" dirty="0" smtClean="0">
-                            <a:latin typeface="Cambria Math" panose="02040503050406030204" pitchFamily="18" charset="0"/>
+                            <a:latin typeface="Cambria Math"/>
                             <a:ea typeface="Cambria Math" panose="02040503050406030204" pitchFamily="18" charset="0"/>
                           </a:rPr>
                         </m:ctrlPr>
@@ -24756,7 +24773,7 @@
                       <m:fPr>
                         <m:ctrlPr>
                           <a:rPr lang="en-US" sz="2800" b="0" i="1" dirty="0" smtClean="0">
-                            <a:latin typeface="Cambria Math" panose="02040503050406030204" pitchFamily="18" charset="0"/>
+                            <a:latin typeface="Cambria Math"/>
                             <a:ea typeface="Cambria Math" panose="02040503050406030204" pitchFamily="18" charset="0"/>
                           </a:rPr>
                         </m:ctrlPr>
@@ -24796,7 +24813,7 @@
                           <m:sSupPr>
                             <m:ctrlPr>
                               <a:rPr lang="en-US" sz="2800" b="0" i="1" dirty="0" smtClean="0">
-                                <a:latin typeface="Cambria Math" panose="02040503050406030204" pitchFamily="18" charset="0"/>
+                                <a:latin typeface="Cambria Math"/>
                                 <a:ea typeface="Cambria Math" panose="02040503050406030204" pitchFamily="18" charset="0"/>
                               </a:rPr>
                             </m:ctrlPr>
@@ -24931,7 +24948,7 @@
                       <m:fPr>
                         <m:ctrlPr>
                           <a:rPr lang="en-US" sz="2800" i="1" dirty="0">
-                            <a:latin typeface="Cambria Math" panose="02040503050406030204" pitchFamily="18" charset="0"/>
+                            <a:latin typeface="Cambria Math"/>
                             <a:ea typeface="Cambria Math" panose="02040503050406030204" pitchFamily="18" charset="0"/>
                           </a:rPr>
                         </m:ctrlPr>
@@ -24941,7 +24958,7 @@
                           <m:sSupPr>
                             <m:ctrlPr>
                               <a:rPr lang="en-US" sz="2800" i="1" dirty="0">
-                                <a:latin typeface="Cambria Math" panose="02040503050406030204" pitchFamily="18" charset="0"/>
+                                <a:latin typeface="Cambria Math"/>
                                 <a:ea typeface="Cambria Math" panose="02040503050406030204" pitchFamily="18" charset="0"/>
                               </a:rPr>
                             </m:ctrlPr>
@@ -25006,7 +25023,7 @@
                           <m:sSupPr>
                             <m:ctrlPr>
                               <a:rPr lang="en-US" sz="2800" i="1" dirty="0">
-                                <a:latin typeface="Cambria Math" panose="02040503050406030204" pitchFamily="18" charset="0"/>
+                                <a:latin typeface="Cambria Math"/>
                                 <a:ea typeface="Cambria Math" panose="02040503050406030204" pitchFamily="18" charset="0"/>
                               </a:rPr>
                             </m:ctrlPr>
@@ -25226,7 +25243,7 @@
                       <m:fPr>
                         <m:ctrlPr>
                           <a:rPr lang="en-US" sz="2800" i="1" dirty="0" smtClean="0">
-                            <a:latin typeface="Cambria Math" panose="02040503050406030204" pitchFamily="18" charset="0"/>
+                            <a:latin typeface="Cambria Math"/>
                             <a:ea typeface="Cambria Math" panose="02040503050406030204" pitchFamily="18" charset="0"/>
                           </a:rPr>
                         </m:ctrlPr>
@@ -25265,7 +25282,7 @@
                       <m:fPr>
                         <m:ctrlPr>
                           <a:rPr lang="en-US" sz="2800" i="1" dirty="0" smtClean="0">
-                            <a:latin typeface="Cambria Math" panose="02040503050406030204" pitchFamily="18" charset="0"/>
+                            <a:latin typeface="Cambria Math"/>
                             <a:ea typeface="Cambria Math" panose="02040503050406030204" pitchFamily="18" charset="0"/>
                           </a:rPr>
                         </m:ctrlPr>
@@ -25300,7 +25317,7 @@
                       <m:fPr>
                         <m:ctrlPr>
                           <a:rPr lang="en-US" sz="2800" b="0" i="1" dirty="0" smtClean="0">
-                            <a:latin typeface="Cambria Math" panose="02040503050406030204" pitchFamily="18" charset="0"/>
+                            <a:latin typeface="Cambria Math"/>
                             <a:ea typeface="Cambria Math" panose="02040503050406030204" pitchFamily="18" charset="0"/>
                           </a:rPr>
                         </m:ctrlPr>
@@ -26200,7 +26217,7 @@
   <a:extraClrSchemeLst/>
   <a:extLst>
     <a:ext uri="{05A4C25C-085E-4340-85A3-A5531E510DB2}">
-      <thm15:themeFamily xmlns:thm15="http://schemas.microsoft.com/office/thememl/2012/main" name="Office Theme" id="{62F939B6-93AF-4DB8-9C6B-D6C7DFDC589F}" vid="{4A3C46E8-61CC-4603-A589-7422A47A8E4A}"/>
+      <thm15:themeFamily xmlns:thm15="http://schemas.microsoft.com/office/thememl/2012/main" xmlns="" name="Office Theme" id="{62F939B6-93AF-4DB8-9C6B-D6C7DFDC589F}" vid="{4A3C46E8-61CC-4603-A589-7422A47A8E4A}"/>
     </a:ext>
   </a:extLst>
 </a:theme>

</xml_diff>